<commit_message>
Connection of valves configurate
</commit_message>
<xml_diff>
--- a/connections/connections.pptx
+++ b/connections/connections.pptx
@@ -6,6 +6,8 @@
   </p:sldMasterIdLst>
   <p:sldIdLst>
     <p:sldId id="256" r:id="rId2"/>
+    <p:sldId id="257" r:id="rId3"/>
+    <p:sldId id="258" r:id="rId4"/>
   </p:sldIdLst>
   <p:sldSz cx="12192000" cy="6858000"/>
   <p:notesSz cx="6858000" cy="9144000"/>
@@ -104,6 +106,11 @@
       </a:defRPr>
     </a:lvl9pPr>
   </p:defaultTextStyle>
+  <p:extLst>
+    <p:ext uri="{EFAFB233-063F-42B5-8137-9DF3F51BA10A}">
+      <p15:sldGuideLst xmlns:p15="http://schemas.microsoft.com/office/powerpoint/2012/main"/>
+    </p:ext>
+  </p:extLst>
 </p:presentation>
 </file>
 
@@ -3913,10 +3920,1650 @@
           </a:fontRef>
         </p:style>
       </p:cxnSp>
+      <p:cxnSp>
+        <p:nvCxnSpPr>
+          <p:cNvPr id="16" name="Conector: angular 15">
+            <a:extLst>
+              <a:ext uri="{FF2B5EF4-FFF2-40B4-BE49-F238E27FC236}">
+                <a16:creationId xmlns:a16="http://schemas.microsoft.com/office/drawing/2014/main" id="{B7CEC4FF-D82C-4CD5-BB89-F03DAD40A566}"/>
+              </a:ext>
+            </a:extLst>
+          </p:cNvPr>
+          <p:cNvCxnSpPr>
+            <a:cxnSpLocks/>
+          </p:cNvCxnSpPr>
+          <p:nvPr/>
+        </p:nvCxnSpPr>
+        <p:spPr>
+          <a:xfrm flipV="1">
+            <a:off x="3388012" y="942736"/>
+            <a:ext cx="2911641" cy="1030888"/>
+          </a:xfrm>
+          <a:prstGeom prst="bentConnector3">
+            <a:avLst>
+              <a:gd name="adj1" fmla="val 50000"/>
+            </a:avLst>
+          </a:prstGeom>
+          <a:ln>
+            <a:tailEnd type="triangle"/>
+          </a:ln>
+        </p:spPr>
+        <p:style>
+          <a:lnRef idx="1">
+            <a:schemeClr val="dk1"/>
+          </a:lnRef>
+          <a:fillRef idx="0">
+            <a:schemeClr val="dk1"/>
+          </a:fillRef>
+          <a:effectRef idx="0">
+            <a:schemeClr val="dk1"/>
+          </a:effectRef>
+          <a:fontRef idx="minor">
+            <a:schemeClr val="tx1"/>
+          </a:fontRef>
+        </p:style>
+      </p:cxnSp>
+      <p:cxnSp>
+        <p:nvCxnSpPr>
+          <p:cNvPr id="18" name="Conector: angular 17">
+            <a:extLst>
+              <a:ext uri="{FF2B5EF4-FFF2-40B4-BE49-F238E27FC236}">
+                <a16:creationId xmlns:a16="http://schemas.microsoft.com/office/drawing/2014/main" id="{C5EC32E0-6B1B-4CC9-9576-F5CF13DCDB2C}"/>
+              </a:ext>
+            </a:extLst>
+          </p:cNvPr>
+          <p:cNvCxnSpPr>
+            <a:cxnSpLocks/>
+          </p:cNvCxnSpPr>
+          <p:nvPr/>
+        </p:nvCxnSpPr>
+        <p:spPr>
+          <a:xfrm flipV="1">
+            <a:off x="3388011" y="1133598"/>
+            <a:ext cx="2942686" cy="1261340"/>
+          </a:xfrm>
+          <a:prstGeom prst="bentConnector3">
+            <a:avLst>
+              <a:gd name="adj1" fmla="val 56565"/>
+            </a:avLst>
+          </a:prstGeom>
+          <a:ln>
+            <a:tailEnd type="triangle"/>
+          </a:ln>
+        </p:spPr>
+        <p:style>
+          <a:lnRef idx="1">
+            <a:schemeClr val="accent1"/>
+          </a:lnRef>
+          <a:fillRef idx="0">
+            <a:schemeClr val="accent1"/>
+          </a:fillRef>
+          <a:effectRef idx="0">
+            <a:schemeClr val="accent1"/>
+          </a:effectRef>
+          <a:fontRef idx="minor">
+            <a:schemeClr val="tx1"/>
+          </a:fontRef>
+        </p:style>
+      </p:cxnSp>
+      <p:cxnSp>
+        <p:nvCxnSpPr>
+          <p:cNvPr id="22" name="Conector: angular 21">
+            <a:extLst>
+              <a:ext uri="{FF2B5EF4-FFF2-40B4-BE49-F238E27FC236}">
+                <a16:creationId xmlns:a16="http://schemas.microsoft.com/office/drawing/2014/main" id="{C468AAAD-2C51-42E8-A8D1-D2BF4EC492E9}"/>
+              </a:ext>
+            </a:extLst>
+          </p:cNvPr>
+          <p:cNvCxnSpPr>
+            <a:cxnSpLocks/>
+          </p:cNvCxnSpPr>
+          <p:nvPr/>
+        </p:nvCxnSpPr>
+        <p:spPr>
+          <a:xfrm flipV="1">
+            <a:off x="3450525" y="1308379"/>
+            <a:ext cx="2817662" cy="1507151"/>
+          </a:xfrm>
+          <a:prstGeom prst="bentConnector3">
+            <a:avLst>
+              <a:gd name="adj1" fmla="val 63255"/>
+            </a:avLst>
+          </a:prstGeom>
+          <a:ln>
+            <a:solidFill>
+              <a:srgbClr val="00B050"/>
+            </a:solidFill>
+            <a:tailEnd type="triangle"/>
+          </a:ln>
+        </p:spPr>
+        <p:style>
+          <a:lnRef idx="1">
+            <a:schemeClr val="accent1"/>
+          </a:lnRef>
+          <a:fillRef idx="0">
+            <a:schemeClr val="accent1"/>
+          </a:fillRef>
+          <a:effectRef idx="0">
+            <a:schemeClr val="accent1"/>
+          </a:effectRef>
+          <a:fontRef idx="minor">
+            <a:schemeClr val="tx1"/>
+          </a:fontRef>
+        </p:style>
+      </p:cxnSp>
     </p:spTree>
     <p:extLst>
       <p:ext uri="{BB962C8B-B14F-4D97-AF65-F5344CB8AC3E}">
         <p14:creationId xmlns:p14="http://schemas.microsoft.com/office/powerpoint/2010/main" val="3783520236"/>
+      </p:ext>
+    </p:extLst>
+  </p:cSld>
+  <p:clrMapOvr>
+    <a:masterClrMapping/>
+  </p:clrMapOvr>
+</p:sld>
+</file>
+
+<file path=ppt/slides/slide2.xml><?xml version="1.0" encoding="utf-8"?>
+<p:sld xmlns:a="http://schemas.openxmlformats.org/drawingml/2006/main" xmlns:r="http://schemas.openxmlformats.org/officeDocument/2006/relationships" xmlns:p="http://schemas.openxmlformats.org/presentationml/2006/main">
+  <p:cSld>
+    <p:spTree>
+      <p:nvGrpSpPr>
+        <p:cNvPr id="1" name=""/>
+        <p:cNvGrpSpPr/>
+        <p:nvPr/>
+      </p:nvGrpSpPr>
+      <p:grpSpPr>
+        <a:xfrm>
+          <a:off x="0" y="0"/>
+          <a:ext cx="0" cy="0"/>
+          <a:chOff x="0" y="0"/>
+          <a:chExt cx="0" cy="0"/>
+        </a:xfrm>
+      </p:grpSpPr>
+      <p:sp>
+        <p:nvSpPr>
+          <p:cNvPr id="4" name="Rectángulo 3">
+            <a:extLst>
+              <a:ext uri="{FF2B5EF4-FFF2-40B4-BE49-F238E27FC236}">
+                <a16:creationId xmlns:a16="http://schemas.microsoft.com/office/drawing/2014/main" id="{1A8A97F7-4E6F-4739-A9E3-E64DE17F3EFE}"/>
+              </a:ext>
+            </a:extLst>
+          </p:cNvPr>
+          <p:cNvSpPr/>
+          <p:nvPr/>
+        </p:nvSpPr>
+        <p:spPr>
+          <a:xfrm>
+            <a:off x="350607" y="133983"/>
+            <a:ext cx="4381649" cy="923330"/>
+          </a:xfrm>
+          <a:prstGeom prst="rect">
+            <a:avLst/>
+          </a:prstGeom>
+          <a:noFill/>
+        </p:spPr>
+        <p:txBody>
+          <a:bodyPr wrap="none" lIns="91440" tIns="45720" rIns="91440" bIns="45720">
+            <a:spAutoFit/>
+          </a:bodyPr>
+          <a:lstStyle/>
+          <a:p>
+            <a:pPr algn="ctr"/>
+            <a:r>
+              <a:rPr lang="es-ES" sz="5400" b="0" cap="none" spc="0" dirty="0">
+                <a:ln w="0"/>
+                <a:solidFill>
+                  <a:schemeClr val="tx1"/>
+                </a:solidFill>
+                <a:effectLst>
+                  <a:outerShdw blurRad="38100" dist="19050" dir="2700000" algn="tl" rotWithShape="0">
+                    <a:schemeClr val="dk1">
+                      <a:alpha val="40000"/>
+                    </a:schemeClr>
+                  </a:outerShdw>
+                </a:effectLst>
+              </a:rPr>
+              <a:t>STEP MOTOR 2</a:t>
+            </a:r>
+          </a:p>
+        </p:txBody>
+      </p:sp>
+      <p:pic>
+        <p:nvPicPr>
+          <p:cNvPr id="5" name="Imagen 4">
+            <a:extLst>
+              <a:ext uri="{FF2B5EF4-FFF2-40B4-BE49-F238E27FC236}">
+                <a16:creationId xmlns:a16="http://schemas.microsoft.com/office/drawing/2014/main" id="{ADA15C06-A964-4FEF-B2AD-8F49DA65238D}"/>
+              </a:ext>
+            </a:extLst>
+          </p:cNvPr>
+          <p:cNvPicPr>
+            <a:picLocks noChangeAspect="1"/>
+          </p:cNvPicPr>
+          <p:nvPr/>
+        </p:nvPicPr>
+        <p:blipFill>
+          <a:blip r:embed="rId2"/>
+          <a:stretch>
+            <a:fillRect/>
+          </a:stretch>
+        </p:blipFill>
+        <p:spPr>
+          <a:xfrm>
+            <a:off x="844840" y="1504748"/>
+            <a:ext cx="2543175" cy="3590925"/>
+          </a:xfrm>
+          <a:prstGeom prst="rect">
+            <a:avLst/>
+          </a:prstGeom>
+        </p:spPr>
+      </p:pic>
+      <p:pic>
+        <p:nvPicPr>
+          <p:cNvPr id="1026" name="Picture 2" descr="ESP32 Wroom32 DevKit Analog Read Example | Circuits4you.com">
+            <a:extLst>
+              <a:ext uri="{FF2B5EF4-FFF2-40B4-BE49-F238E27FC236}">
+                <a16:creationId xmlns:a16="http://schemas.microsoft.com/office/drawing/2014/main" id="{070BCC20-3243-4869-8E35-686DDE0E662D}"/>
+              </a:ext>
+            </a:extLst>
+          </p:cNvPr>
+          <p:cNvPicPr>
+            <a:picLocks noChangeAspect="1" noChangeArrowheads="1"/>
+          </p:cNvPicPr>
+          <p:nvPr/>
+        </p:nvPicPr>
+        <p:blipFill rotWithShape="1">
+          <a:blip r:embed="rId3">
+            <a:extLst>
+              <a:ext uri="{28A0092B-C50C-407E-A947-70E740481C1C}">
+                <a14:useLocalDpi xmlns:a14="http://schemas.microsoft.com/office/drawing/2010/main" val="0"/>
+              </a:ext>
+            </a:extLst>
+          </a:blip>
+          <a:srcRect l="18996" r="18243" b="26775"/>
+          <a:stretch/>
+        </p:blipFill>
+        <p:spPr bwMode="auto">
+          <a:xfrm>
+            <a:off x="6362163" y="400303"/>
+            <a:ext cx="4984997" cy="3590925"/>
+          </a:xfrm>
+          <a:prstGeom prst="rect">
+            <a:avLst/>
+          </a:prstGeom>
+          <a:noFill/>
+          <a:extLst>
+            <a:ext uri="{909E8E84-426E-40DD-AFC4-6F175D3DCCD1}">
+              <a14:hiddenFill xmlns:a14="http://schemas.microsoft.com/office/drawing/2010/main">
+                <a:solidFill>
+                  <a:srgbClr val="FFFFFF"/>
+                </a:solidFill>
+              </a14:hiddenFill>
+            </a:ext>
+          </a:extLst>
+        </p:spPr>
+      </p:pic>
+      <p:pic>
+        <p:nvPicPr>
+          <p:cNvPr id="6" name="Imagen 5">
+            <a:extLst>
+              <a:ext uri="{FF2B5EF4-FFF2-40B4-BE49-F238E27FC236}">
+                <a16:creationId xmlns:a16="http://schemas.microsoft.com/office/drawing/2014/main" id="{2415C8A4-0123-4E17-AA69-391DA96641EF}"/>
+              </a:ext>
+            </a:extLst>
+          </p:cNvPr>
+          <p:cNvPicPr>
+            <a:picLocks noChangeAspect="1"/>
+          </p:cNvPicPr>
+          <p:nvPr/>
+        </p:nvPicPr>
+        <p:blipFill>
+          <a:blip r:embed="rId4"/>
+          <a:stretch>
+            <a:fillRect/>
+          </a:stretch>
+        </p:blipFill>
+        <p:spPr>
+          <a:xfrm>
+            <a:off x="6679375" y="4756878"/>
+            <a:ext cx="3228503" cy="1348302"/>
+          </a:xfrm>
+          <a:prstGeom prst="rect">
+            <a:avLst/>
+          </a:prstGeom>
+        </p:spPr>
+      </p:pic>
+      <p:pic>
+        <p:nvPicPr>
+          <p:cNvPr id="7" name="Imagen 6">
+            <a:extLst>
+              <a:ext uri="{FF2B5EF4-FFF2-40B4-BE49-F238E27FC236}">
+                <a16:creationId xmlns:a16="http://schemas.microsoft.com/office/drawing/2014/main" id="{140DA9D9-1894-4C7D-8568-D313EEA7ECEE}"/>
+              </a:ext>
+            </a:extLst>
+          </p:cNvPr>
+          <p:cNvPicPr>
+            <a:picLocks noChangeAspect="1"/>
+          </p:cNvPicPr>
+          <p:nvPr/>
+        </p:nvPicPr>
+        <p:blipFill>
+          <a:blip r:embed="rId5"/>
+          <a:stretch>
+            <a:fillRect/>
+          </a:stretch>
+        </p:blipFill>
+        <p:spPr>
+          <a:xfrm>
+            <a:off x="4070268" y="4780526"/>
+            <a:ext cx="1323975" cy="419100"/>
+          </a:xfrm>
+          <a:prstGeom prst="rect">
+            <a:avLst/>
+          </a:prstGeom>
+        </p:spPr>
+      </p:pic>
+      <p:cxnSp>
+        <p:nvCxnSpPr>
+          <p:cNvPr id="9" name="Conector: angular 8">
+            <a:extLst>
+              <a:ext uri="{FF2B5EF4-FFF2-40B4-BE49-F238E27FC236}">
+                <a16:creationId xmlns:a16="http://schemas.microsoft.com/office/drawing/2014/main" id="{86820B00-B22B-4B27-B764-8DD6A29361BD}"/>
+              </a:ext>
+            </a:extLst>
+          </p:cNvPr>
+          <p:cNvCxnSpPr/>
+          <p:nvPr/>
+        </p:nvCxnSpPr>
+        <p:spPr>
+          <a:xfrm>
+            <a:off x="3388015" y="4398579"/>
+            <a:ext cx="682253" cy="381947"/>
+          </a:xfrm>
+          <a:prstGeom prst="bentConnector3">
+            <a:avLst/>
+          </a:prstGeom>
+          <a:ln w="12700">
+            <a:solidFill>
+              <a:schemeClr val="tx1"/>
+            </a:solidFill>
+            <a:tailEnd type="triangle"/>
+          </a:ln>
+        </p:spPr>
+        <p:style>
+          <a:lnRef idx="1">
+            <a:schemeClr val="accent1"/>
+          </a:lnRef>
+          <a:fillRef idx="0">
+            <a:schemeClr val="accent1"/>
+          </a:fillRef>
+          <a:effectRef idx="0">
+            <a:schemeClr val="accent1"/>
+          </a:effectRef>
+          <a:fontRef idx="minor">
+            <a:schemeClr val="tx1"/>
+          </a:fontRef>
+        </p:style>
+      </p:cxnSp>
+      <p:cxnSp>
+        <p:nvCxnSpPr>
+          <p:cNvPr id="11" name="Conector: angular 10">
+            <a:extLst>
+              <a:ext uri="{FF2B5EF4-FFF2-40B4-BE49-F238E27FC236}">
+                <a16:creationId xmlns:a16="http://schemas.microsoft.com/office/drawing/2014/main" id="{2F47B22D-D330-488D-8696-756EC19958B1}"/>
+              </a:ext>
+            </a:extLst>
+          </p:cNvPr>
+          <p:cNvCxnSpPr/>
+          <p:nvPr/>
+        </p:nvCxnSpPr>
+        <p:spPr>
+          <a:xfrm>
+            <a:off x="3388015" y="4608129"/>
+            <a:ext cx="682253" cy="381947"/>
+          </a:xfrm>
+          <a:prstGeom prst="bentConnector3">
+            <a:avLst>
+              <a:gd name="adj1" fmla="val 27347"/>
+            </a:avLst>
+          </a:prstGeom>
+          <a:ln w="12700">
+            <a:solidFill>
+              <a:srgbClr val="FF0000"/>
+            </a:solidFill>
+            <a:tailEnd type="triangle"/>
+          </a:ln>
+        </p:spPr>
+        <p:style>
+          <a:lnRef idx="1">
+            <a:schemeClr val="accent1"/>
+          </a:lnRef>
+          <a:fillRef idx="0">
+            <a:schemeClr val="accent1"/>
+          </a:fillRef>
+          <a:effectRef idx="0">
+            <a:schemeClr val="accent1"/>
+          </a:effectRef>
+          <a:fontRef idx="minor">
+            <a:schemeClr val="tx1"/>
+          </a:fontRef>
+        </p:style>
+      </p:cxnSp>
+      <p:cxnSp>
+        <p:nvCxnSpPr>
+          <p:cNvPr id="14" name="Conector: angular 13">
+            <a:extLst>
+              <a:ext uri="{FF2B5EF4-FFF2-40B4-BE49-F238E27FC236}">
+                <a16:creationId xmlns:a16="http://schemas.microsoft.com/office/drawing/2014/main" id="{547ED3BE-E553-4F3D-A9EA-87C24DED7CB8}"/>
+              </a:ext>
+            </a:extLst>
+          </p:cNvPr>
+          <p:cNvCxnSpPr>
+            <a:cxnSpLocks/>
+          </p:cNvCxnSpPr>
+          <p:nvPr/>
+        </p:nvCxnSpPr>
+        <p:spPr>
+          <a:xfrm>
+            <a:off x="3388015" y="3507828"/>
+            <a:ext cx="3291360" cy="1654645"/>
+          </a:xfrm>
+          <a:prstGeom prst="bentConnector3">
+            <a:avLst>
+              <a:gd name="adj1" fmla="val 90303"/>
+            </a:avLst>
+          </a:prstGeom>
+          <a:ln w="12700">
+            <a:solidFill>
+              <a:schemeClr val="tx1"/>
+            </a:solidFill>
+            <a:tailEnd type="triangle"/>
+          </a:ln>
+        </p:spPr>
+        <p:style>
+          <a:lnRef idx="1">
+            <a:schemeClr val="accent1"/>
+          </a:lnRef>
+          <a:fillRef idx="0">
+            <a:schemeClr val="accent1"/>
+          </a:fillRef>
+          <a:effectRef idx="0">
+            <a:schemeClr val="accent1"/>
+          </a:effectRef>
+          <a:fontRef idx="minor">
+            <a:schemeClr val="tx1"/>
+          </a:fontRef>
+        </p:style>
+      </p:cxnSp>
+      <p:cxnSp>
+        <p:nvCxnSpPr>
+          <p:cNvPr id="17" name="Conector: angular 16">
+            <a:extLst>
+              <a:ext uri="{FF2B5EF4-FFF2-40B4-BE49-F238E27FC236}">
+                <a16:creationId xmlns:a16="http://schemas.microsoft.com/office/drawing/2014/main" id="{BF04249D-5249-4A84-8044-DFB2BC929381}"/>
+              </a:ext>
+            </a:extLst>
+          </p:cNvPr>
+          <p:cNvCxnSpPr>
+            <a:cxnSpLocks/>
+            <a:endCxn id="6" idx="1"/>
+          </p:cNvCxnSpPr>
+          <p:nvPr/>
+        </p:nvCxnSpPr>
+        <p:spPr>
+          <a:xfrm>
+            <a:off x="3450525" y="3762229"/>
+            <a:ext cx="3228850" cy="1668800"/>
+          </a:xfrm>
+          <a:prstGeom prst="bentConnector3">
+            <a:avLst>
+              <a:gd name="adj1" fmla="val 81910"/>
+            </a:avLst>
+          </a:prstGeom>
+          <a:ln w="12700">
+            <a:solidFill>
+              <a:srgbClr val="00B050"/>
+            </a:solidFill>
+            <a:tailEnd type="triangle"/>
+          </a:ln>
+        </p:spPr>
+        <p:style>
+          <a:lnRef idx="1">
+            <a:schemeClr val="accent1"/>
+          </a:lnRef>
+          <a:fillRef idx="0">
+            <a:schemeClr val="accent1"/>
+          </a:fillRef>
+          <a:effectRef idx="0">
+            <a:schemeClr val="accent1"/>
+          </a:effectRef>
+          <a:fontRef idx="minor">
+            <a:schemeClr val="tx1"/>
+          </a:fontRef>
+        </p:style>
+      </p:cxnSp>
+      <p:cxnSp>
+        <p:nvCxnSpPr>
+          <p:cNvPr id="21" name="Conector: angular 20">
+            <a:extLst>
+              <a:ext uri="{FF2B5EF4-FFF2-40B4-BE49-F238E27FC236}">
+                <a16:creationId xmlns:a16="http://schemas.microsoft.com/office/drawing/2014/main" id="{969E7FB1-2AD9-4EFC-A734-083D6D695596}"/>
+              </a:ext>
+            </a:extLst>
+          </p:cNvPr>
+          <p:cNvCxnSpPr>
+            <a:cxnSpLocks/>
+          </p:cNvCxnSpPr>
+          <p:nvPr/>
+        </p:nvCxnSpPr>
+        <p:spPr>
+          <a:xfrm>
+            <a:off x="3388015" y="3991228"/>
+            <a:ext cx="3862791" cy="2113952"/>
+          </a:xfrm>
+          <a:prstGeom prst="bentConnector3">
+            <a:avLst>
+              <a:gd name="adj1" fmla="val 65337"/>
+            </a:avLst>
+          </a:prstGeom>
+          <a:ln w="12700">
+            <a:solidFill>
+              <a:srgbClr val="FF0000"/>
+            </a:solidFill>
+            <a:tailEnd type="triangle"/>
+          </a:ln>
+        </p:spPr>
+        <p:style>
+          <a:lnRef idx="1">
+            <a:schemeClr val="accent1"/>
+          </a:lnRef>
+          <a:fillRef idx="0">
+            <a:schemeClr val="accent1"/>
+          </a:fillRef>
+          <a:effectRef idx="0">
+            <a:schemeClr val="accent1"/>
+          </a:effectRef>
+          <a:fontRef idx="minor">
+            <a:schemeClr val="tx1"/>
+          </a:fontRef>
+        </p:style>
+      </p:cxnSp>
+      <p:cxnSp>
+        <p:nvCxnSpPr>
+          <p:cNvPr id="25" name="Conector: angular 24">
+            <a:extLst>
+              <a:ext uri="{FF2B5EF4-FFF2-40B4-BE49-F238E27FC236}">
+                <a16:creationId xmlns:a16="http://schemas.microsoft.com/office/drawing/2014/main" id="{4C60193E-BEEF-43A9-A2EB-B0394AEA5EDB}"/>
+              </a:ext>
+            </a:extLst>
+          </p:cNvPr>
+          <p:cNvCxnSpPr>
+            <a:cxnSpLocks/>
+          </p:cNvCxnSpPr>
+          <p:nvPr/>
+        </p:nvCxnSpPr>
+        <p:spPr>
+          <a:xfrm>
+            <a:off x="3395287" y="4213804"/>
+            <a:ext cx="4190369" cy="2120375"/>
+          </a:xfrm>
+          <a:prstGeom prst="bentConnector3">
+            <a:avLst>
+              <a:gd name="adj1" fmla="val 50000"/>
+            </a:avLst>
+          </a:prstGeom>
+          <a:ln>
+            <a:solidFill>
+              <a:srgbClr val="190060"/>
+            </a:solidFill>
+            <a:tailEnd type="triangle"/>
+          </a:ln>
+        </p:spPr>
+        <p:style>
+          <a:lnRef idx="1">
+            <a:schemeClr val="accent1"/>
+          </a:lnRef>
+          <a:fillRef idx="0">
+            <a:schemeClr val="accent1"/>
+          </a:fillRef>
+          <a:effectRef idx="0">
+            <a:schemeClr val="accent1"/>
+          </a:effectRef>
+          <a:fontRef idx="minor">
+            <a:schemeClr val="tx1"/>
+          </a:fontRef>
+        </p:style>
+      </p:cxnSp>
+      <p:cxnSp>
+        <p:nvCxnSpPr>
+          <p:cNvPr id="28" name="Conector: angular 27">
+            <a:extLst>
+              <a:ext uri="{FF2B5EF4-FFF2-40B4-BE49-F238E27FC236}">
+                <a16:creationId xmlns:a16="http://schemas.microsoft.com/office/drawing/2014/main" id="{94565DB2-AB63-4646-94A1-9EF9A78DA23B}"/>
+              </a:ext>
+            </a:extLst>
+          </p:cNvPr>
+          <p:cNvCxnSpPr>
+            <a:cxnSpLocks/>
+          </p:cNvCxnSpPr>
+          <p:nvPr/>
+        </p:nvCxnSpPr>
+        <p:spPr>
+          <a:xfrm>
+            <a:off x="3388014" y="2183174"/>
+            <a:ext cx="3128696" cy="942707"/>
+          </a:xfrm>
+          <a:prstGeom prst="bentConnector3">
+            <a:avLst>
+              <a:gd name="adj1" fmla="val 50000"/>
+            </a:avLst>
+          </a:prstGeom>
+          <a:ln w="12700">
+            <a:solidFill>
+              <a:srgbClr val="FF0000"/>
+            </a:solidFill>
+            <a:tailEnd type="triangle"/>
+          </a:ln>
+        </p:spPr>
+        <p:style>
+          <a:lnRef idx="1">
+            <a:schemeClr val="accent1"/>
+          </a:lnRef>
+          <a:fillRef idx="0">
+            <a:schemeClr val="accent1"/>
+          </a:fillRef>
+          <a:effectRef idx="0">
+            <a:schemeClr val="accent1"/>
+          </a:effectRef>
+          <a:fontRef idx="minor">
+            <a:schemeClr val="tx1"/>
+          </a:fontRef>
+        </p:style>
+      </p:cxnSp>
+      <p:cxnSp>
+        <p:nvCxnSpPr>
+          <p:cNvPr id="30" name="Conector: angular 29">
+            <a:extLst>
+              <a:ext uri="{FF2B5EF4-FFF2-40B4-BE49-F238E27FC236}">
+                <a16:creationId xmlns:a16="http://schemas.microsoft.com/office/drawing/2014/main" id="{2622BD32-B898-4F13-9721-AF3E261AF7DD}"/>
+              </a:ext>
+            </a:extLst>
+          </p:cNvPr>
+          <p:cNvCxnSpPr>
+            <a:cxnSpLocks/>
+          </p:cNvCxnSpPr>
+          <p:nvPr/>
+        </p:nvCxnSpPr>
+        <p:spPr>
+          <a:xfrm>
+            <a:off x="3388013" y="2615846"/>
+            <a:ext cx="3128697" cy="510035"/>
+          </a:xfrm>
+          <a:prstGeom prst="bentConnector3">
+            <a:avLst>
+              <a:gd name="adj1" fmla="val 50000"/>
+            </a:avLst>
+          </a:prstGeom>
+          <a:ln w="12700">
+            <a:solidFill>
+              <a:srgbClr val="FF0000"/>
+            </a:solidFill>
+            <a:tailEnd type="triangle"/>
+          </a:ln>
+        </p:spPr>
+        <p:style>
+          <a:lnRef idx="1">
+            <a:schemeClr val="accent1"/>
+          </a:lnRef>
+          <a:fillRef idx="0">
+            <a:schemeClr val="accent1"/>
+          </a:fillRef>
+          <a:effectRef idx="0">
+            <a:schemeClr val="accent1"/>
+          </a:effectRef>
+          <a:fontRef idx="minor">
+            <a:schemeClr val="tx1"/>
+          </a:fontRef>
+        </p:style>
+      </p:cxnSp>
+      <p:cxnSp>
+        <p:nvCxnSpPr>
+          <p:cNvPr id="32" name="Conector: angular 31">
+            <a:extLst>
+              <a:ext uri="{FF2B5EF4-FFF2-40B4-BE49-F238E27FC236}">
+                <a16:creationId xmlns:a16="http://schemas.microsoft.com/office/drawing/2014/main" id="{97EFC839-CB7F-4F72-BB91-692A44CDEF94}"/>
+              </a:ext>
+            </a:extLst>
+          </p:cNvPr>
+          <p:cNvCxnSpPr>
+            <a:cxnSpLocks/>
+          </p:cNvCxnSpPr>
+          <p:nvPr/>
+        </p:nvCxnSpPr>
+        <p:spPr>
+          <a:xfrm>
+            <a:off x="3388012" y="3061547"/>
+            <a:ext cx="3128698" cy="64334"/>
+          </a:xfrm>
+          <a:prstGeom prst="bentConnector3">
+            <a:avLst>
+              <a:gd name="adj1" fmla="val 50000"/>
+            </a:avLst>
+          </a:prstGeom>
+          <a:ln w="12700">
+            <a:solidFill>
+              <a:srgbClr val="FF0000"/>
+            </a:solidFill>
+            <a:tailEnd type="triangle"/>
+          </a:ln>
+        </p:spPr>
+        <p:style>
+          <a:lnRef idx="1">
+            <a:schemeClr val="accent1"/>
+          </a:lnRef>
+          <a:fillRef idx="0">
+            <a:schemeClr val="accent1"/>
+          </a:fillRef>
+          <a:effectRef idx="0">
+            <a:schemeClr val="accent1"/>
+          </a:effectRef>
+          <a:fontRef idx="minor">
+            <a:schemeClr val="tx1"/>
+          </a:fontRef>
+        </p:style>
+      </p:cxnSp>
+      <p:cxnSp>
+        <p:nvCxnSpPr>
+          <p:cNvPr id="16" name="Conector: angular 15">
+            <a:extLst>
+              <a:ext uri="{FF2B5EF4-FFF2-40B4-BE49-F238E27FC236}">
+                <a16:creationId xmlns:a16="http://schemas.microsoft.com/office/drawing/2014/main" id="{B7CEC4FF-D82C-4CD5-BB89-F03DAD40A566}"/>
+              </a:ext>
+            </a:extLst>
+          </p:cNvPr>
+          <p:cNvCxnSpPr>
+            <a:cxnSpLocks/>
+          </p:cNvCxnSpPr>
+          <p:nvPr/>
+        </p:nvCxnSpPr>
+        <p:spPr>
+          <a:xfrm flipV="1">
+            <a:off x="3388012" y="1426971"/>
+            <a:ext cx="2880175" cy="546654"/>
+          </a:xfrm>
+          <a:prstGeom prst="bentConnector3">
+            <a:avLst>
+              <a:gd name="adj1" fmla="val 69228"/>
+            </a:avLst>
+          </a:prstGeom>
+          <a:ln>
+            <a:tailEnd type="triangle"/>
+          </a:ln>
+        </p:spPr>
+        <p:style>
+          <a:lnRef idx="1">
+            <a:schemeClr val="dk1"/>
+          </a:lnRef>
+          <a:fillRef idx="0">
+            <a:schemeClr val="dk1"/>
+          </a:fillRef>
+          <a:effectRef idx="0">
+            <a:schemeClr val="dk1"/>
+          </a:effectRef>
+          <a:fontRef idx="minor">
+            <a:schemeClr val="tx1"/>
+          </a:fontRef>
+        </p:style>
+      </p:cxnSp>
+      <p:cxnSp>
+        <p:nvCxnSpPr>
+          <p:cNvPr id="18" name="Conector: angular 17">
+            <a:extLst>
+              <a:ext uri="{FF2B5EF4-FFF2-40B4-BE49-F238E27FC236}">
+                <a16:creationId xmlns:a16="http://schemas.microsoft.com/office/drawing/2014/main" id="{C5EC32E0-6B1B-4CC9-9576-F5CF13DCDB2C}"/>
+              </a:ext>
+            </a:extLst>
+          </p:cNvPr>
+          <p:cNvCxnSpPr>
+            <a:cxnSpLocks/>
+          </p:cNvCxnSpPr>
+          <p:nvPr/>
+        </p:nvCxnSpPr>
+        <p:spPr>
+          <a:xfrm flipV="1">
+            <a:off x="3388011" y="1658374"/>
+            <a:ext cx="2880176" cy="736564"/>
+          </a:xfrm>
+          <a:prstGeom prst="bentConnector3">
+            <a:avLst>
+              <a:gd name="adj1" fmla="val 75488"/>
+            </a:avLst>
+          </a:prstGeom>
+          <a:ln>
+            <a:tailEnd type="triangle"/>
+          </a:ln>
+        </p:spPr>
+        <p:style>
+          <a:lnRef idx="1">
+            <a:schemeClr val="accent1"/>
+          </a:lnRef>
+          <a:fillRef idx="0">
+            <a:schemeClr val="accent1"/>
+          </a:fillRef>
+          <a:effectRef idx="0">
+            <a:schemeClr val="accent1"/>
+          </a:effectRef>
+          <a:fontRef idx="minor">
+            <a:schemeClr val="tx1"/>
+          </a:fontRef>
+        </p:style>
+      </p:cxnSp>
+      <p:cxnSp>
+        <p:nvCxnSpPr>
+          <p:cNvPr id="22" name="Conector: angular 21">
+            <a:extLst>
+              <a:ext uri="{FF2B5EF4-FFF2-40B4-BE49-F238E27FC236}">
+                <a16:creationId xmlns:a16="http://schemas.microsoft.com/office/drawing/2014/main" id="{C468AAAD-2C51-42E8-A8D1-D2BF4EC492E9}"/>
+              </a:ext>
+            </a:extLst>
+          </p:cNvPr>
+          <p:cNvCxnSpPr>
+            <a:cxnSpLocks/>
+          </p:cNvCxnSpPr>
+          <p:nvPr/>
+        </p:nvCxnSpPr>
+        <p:spPr>
+          <a:xfrm flipV="1">
+            <a:off x="3450525" y="1815921"/>
+            <a:ext cx="2817662" cy="999610"/>
+          </a:xfrm>
+          <a:prstGeom prst="bentConnector3">
+            <a:avLst>
+              <a:gd name="adj1" fmla="val 81538"/>
+            </a:avLst>
+          </a:prstGeom>
+          <a:ln>
+            <a:solidFill>
+              <a:srgbClr val="00B050"/>
+            </a:solidFill>
+            <a:tailEnd type="triangle"/>
+          </a:ln>
+        </p:spPr>
+        <p:style>
+          <a:lnRef idx="1">
+            <a:schemeClr val="accent1"/>
+          </a:lnRef>
+          <a:fillRef idx="0">
+            <a:schemeClr val="accent1"/>
+          </a:fillRef>
+          <a:effectRef idx="0">
+            <a:schemeClr val="accent1"/>
+          </a:effectRef>
+          <a:fontRef idx="minor">
+            <a:schemeClr val="tx1"/>
+          </a:fontRef>
+        </p:style>
+      </p:cxnSp>
+    </p:spTree>
+    <p:extLst>
+      <p:ext uri="{BB962C8B-B14F-4D97-AF65-F5344CB8AC3E}">
+        <p14:creationId xmlns:p14="http://schemas.microsoft.com/office/powerpoint/2010/main" val="2006235263"/>
+      </p:ext>
+    </p:extLst>
+  </p:cSld>
+  <p:clrMapOvr>
+    <a:masterClrMapping/>
+  </p:clrMapOvr>
+</p:sld>
+</file>
+
+<file path=ppt/slides/slide3.xml><?xml version="1.0" encoding="utf-8"?>
+<p:sld xmlns:a="http://schemas.openxmlformats.org/drawingml/2006/main" xmlns:r="http://schemas.openxmlformats.org/officeDocument/2006/relationships" xmlns:p="http://schemas.openxmlformats.org/presentationml/2006/main">
+  <p:cSld>
+    <p:spTree>
+      <p:nvGrpSpPr>
+        <p:cNvPr id="1" name=""/>
+        <p:cNvGrpSpPr/>
+        <p:nvPr/>
+      </p:nvGrpSpPr>
+      <p:grpSpPr>
+        <a:xfrm>
+          <a:off x="0" y="0"/>
+          <a:ext cx="0" cy="0"/>
+          <a:chOff x="0" y="0"/>
+          <a:chExt cx="0" cy="0"/>
+        </a:xfrm>
+      </p:grpSpPr>
+      <p:sp>
+        <p:nvSpPr>
+          <p:cNvPr id="4" name="Rectángulo 3">
+            <a:extLst>
+              <a:ext uri="{FF2B5EF4-FFF2-40B4-BE49-F238E27FC236}">
+                <a16:creationId xmlns:a16="http://schemas.microsoft.com/office/drawing/2014/main" id="{1A8A97F7-4E6F-4739-A9E3-E64DE17F3EFE}"/>
+              </a:ext>
+            </a:extLst>
+          </p:cNvPr>
+          <p:cNvSpPr/>
+          <p:nvPr/>
+        </p:nvSpPr>
+        <p:spPr>
+          <a:xfrm>
+            <a:off x="350607" y="133983"/>
+            <a:ext cx="4381649" cy="923330"/>
+          </a:xfrm>
+          <a:prstGeom prst="rect">
+            <a:avLst/>
+          </a:prstGeom>
+          <a:noFill/>
+        </p:spPr>
+        <p:txBody>
+          <a:bodyPr wrap="none" lIns="91440" tIns="45720" rIns="91440" bIns="45720">
+            <a:spAutoFit/>
+          </a:bodyPr>
+          <a:lstStyle/>
+          <a:p>
+            <a:pPr algn="ctr"/>
+            <a:r>
+              <a:rPr lang="es-ES" sz="5400" b="0" cap="none" spc="0" dirty="0">
+                <a:ln w="0"/>
+                <a:solidFill>
+                  <a:schemeClr val="tx1"/>
+                </a:solidFill>
+                <a:effectLst>
+                  <a:outerShdw blurRad="38100" dist="19050" dir="2700000" algn="tl" rotWithShape="0">
+                    <a:schemeClr val="dk1">
+                      <a:alpha val="40000"/>
+                    </a:schemeClr>
+                  </a:outerShdw>
+                </a:effectLst>
+              </a:rPr>
+              <a:t>STEP MOTOR 3</a:t>
+            </a:r>
+          </a:p>
+        </p:txBody>
+      </p:sp>
+      <p:pic>
+        <p:nvPicPr>
+          <p:cNvPr id="5" name="Imagen 4">
+            <a:extLst>
+              <a:ext uri="{FF2B5EF4-FFF2-40B4-BE49-F238E27FC236}">
+                <a16:creationId xmlns:a16="http://schemas.microsoft.com/office/drawing/2014/main" id="{ADA15C06-A964-4FEF-B2AD-8F49DA65238D}"/>
+              </a:ext>
+            </a:extLst>
+          </p:cNvPr>
+          <p:cNvPicPr>
+            <a:picLocks noChangeAspect="1"/>
+          </p:cNvPicPr>
+          <p:nvPr/>
+        </p:nvPicPr>
+        <p:blipFill>
+          <a:blip r:embed="rId2"/>
+          <a:stretch>
+            <a:fillRect/>
+          </a:stretch>
+        </p:blipFill>
+        <p:spPr>
+          <a:xfrm>
+            <a:off x="844840" y="1504748"/>
+            <a:ext cx="2543175" cy="3590925"/>
+          </a:xfrm>
+          <a:prstGeom prst="rect">
+            <a:avLst/>
+          </a:prstGeom>
+        </p:spPr>
+      </p:pic>
+      <p:pic>
+        <p:nvPicPr>
+          <p:cNvPr id="1026" name="Picture 2" descr="ESP32 Wroom32 DevKit Analog Read Example | Circuits4you.com">
+            <a:extLst>
+              <a:ext uri="{FF2B5EF4-FFF2-40B4-BE49-F238E27FC236}">
+                <a16:creationId xmlns:a16="http://schemas.microsoft.com/office/drawing/2014/main" id="{070BCC20-3243-4869-8E35-686DDE0E662D}"/>
+              </a:ext>
+            </a:extLst>
+          </p:cNvPr>
+          <p:cNvPicPr>
+            <a:picLocks noChangeAspect="1" noChangeArrowheads="1"/>
+          </p:cNvPicPr>
+          <p:nvPr/>
+        </p:nvPicPr>
+        <p:blipFill rotWithShape="1">
+          <a:blip r:embed="rId3">
+            <a:extLst>
+              <a:ext uri="{28A0092B-C50C-407E-A947-70E740481C1C}">
+                <a14:useLocalDpi xmlns:a14="http://schemas.microsoft.com/office/drawing/2010/main" val="0"/>
+              </a:ext>
+            </a:extLst>
+          </a:blip>
+          <a:srcRect l="18996" r="18243" b="26775"/>
+          <a:stretch/>
+        </p:blipFill>
+        <p:spPr bwMode="auto">
+          <a:xfrm>
+            <a:off x="6362163" y="400303"/>
+            <a:ext cx="4984997" cy="3590925"/>
+          </a:xfrm>
+          <a:prstGeom prst="rect">
+            <a:avLst/>
+          </a:prstGeom>
+          <a:noFill/>
+          <a:extLst>
+            <a:ext uri="{909E8E84-426E-40DD-AFC4-6F175D3DCCD1}">
+              <a14:hiddenFill xmlns:a14="http://schemas.microsoft.com/office/drawing/2010/main">
+                <a:solidFill>
+                  <a:srgbClr val="FFFFFF"/>
+                </a:solidFill>
+              </a14:hiddenFill>
+            </a:ext>
+          </a:extLst>
+        </p:spPr>
+      </p:pic>
+      <p:pic>
+        <p:nvPicPr>
+          <p:cNvPr id="6" name="Imagen 5">
+            <a:extLst>
+              <a:ext uri="{FF2B5EF4-FFF2-40B4-BE49-F238E27FC236}">
+                <a16:creationId xmlns:a16="http://schemas.microsoft.com/office/drawing/2014/main" id="{2415C8A4-0123-4E17-AA69-391DA96641EF}"/>
+              </a:ext>
+            </a:extLst>
+          </p:cNvPr>
+          <p:cNvPicPr>
+            <a:picLocks noChangeAspect="1"/>
+          </p:cNvPicPr>
+          <p:nvPr/>
+        </p:nvPicPr>
+        <p:blipFill>
+          <a:blip r:embed="rId4"/>
+          <a:stretch>
+            <a:fillRect/>
+          </a:stretch>
+        </p:blipFill>
+        <p:spPr>
+          <a:xfrm>
+            <a:off x="6679375" y="4756878"/>
+            <a:ext cx="3228503" cy="1348302"/>
+          </a:xfrm>
+          <a:prstGeom prst="rect">
+            <a:avLst/>
+          </a:prstGeom>
+        </p:spPr>
+      </p:pic>
+      <p:pic>
+        <p:nvPicPr>
+          <p:cNvPr id="7" name="Imagen 6">
+            <a:extLst>
+              <a:ext uri="{FF2B5EF4-FFF2-40B4-BE49-F238E27FC236}">
+                <a16:creationId xmlns:a16="http://schemas.microsoft.com/office/drawing/2014/main" id="{140DA9D9-1894-4C7D-8568-D313EEA7ECEE}"/>
+              </a:ext>
+            </a:extLst>
+          </p:cNvPr>
+          <p:cNvPicPr>
+            <a:picLocks noChangeAspect="1"/>
+          </p:cNvPicPr>
+          <p:nvPr/>
+        </p:nvPicPr>
+        <p:blipFill>
+          <a:blip r:embed="rId5"/>
+          <a:stretch>
+            <a:fillRect/>
+          </a:stretch>
+        </p:blipFill>
+        <p:spPr>
+          <a:xfrm>
+            <a:off x="4070268" y="4780526"/>
+            <a:ext cx="1323975" cy="419100"/>
+          </a:xfrm>
+          <a:prstGeom prst="rect">
+            <a:avLst/>
+          </a:prstGeom>
+        </p:spPr>
+      </p:pic>
+      <p:cxnSp>
+        <p:nvCxnSpPr>
+          <p:cNvPr id="9" name="Conector: angular 8">
+            <a:extLst>
+              <a:ext uri="{FF2B5EF4-FFF2-40B4-BE49-F238E27FC236}">
+                <a16:creationId xmlns:a16="http://schemas.microsoft.com/office/drawing/2014/main" id="{86820B00-B22B-4B27-B764-8DD6A29361BD}"/>
+              </a:ext>
+            </a:extLst>
+          </p:cNvPr>
+          <p:cNvCxnSpPr/>
+          <p:nvPr/>
+        </p:nvCxnSpPr>
+        <p:spPr>
+          <a:xfrm>
+            <a:off x="3388015" y="4398579"/>
+            <a:ext cx="682253" cy="381947"/>
+          </a:xfrm>
+          <a:prstGeom prst="bentConnector3">
+            <a:avLst/>
+          </a:prstGeom>
+          <a:ln w="12700">
+            <a:solidFill>
+              <a:schemeClr val="tx1"/>
+            </a:solidFill>
+            <a:tailEnd type="triangle"/>
+          </a:ln>
+        </p:spPr>
+        <p:style>
+          <a:lnRef idx="1">
+            <a:schemeClr val="accent1"/>
+          </a:lnRef>
+          <a:fillRef idx="0">
+            <a:schemeClr val="accent1"/>
+          </a:fillRef>
+          <a:effectRef idx="0">
+            <a:schemeClr val="accent1"/>
+          </a:effectRef>
+          <a:fontRef idx="minor">
+            <a:schemeClr val="tx1"/>
+          </a:fontRef>
+        </p:style>
+      </p:cxnSp>
+      <p:cxnSp>
+        <p:nvCxnSpPr>
+          <p:cNvPr id="11" name="Conector: angular 10">
+            <a:extLst>
+              <a:ext uri="{FF2B5EF4-FFF2-40B4-BE49-F238E27FC236}">
+                <a16:creationId xmlns:a16="http://schemas.microsoft.com/office/drawing/2014/main" id="{2F47B22D-D330-488D-8696-756EC19958B1}"/>
+              </a:ext>
+            </a:extLst>
+          </p:cNvPr>
+          <p:cNvCxnSpPr/>
+          <p:nvPr/>
+        </p:nvCxnSpPr>
+        <p:spPr>
+          <a:xfrm>
+            <a:off x="3388015" y="4608129"/>
+            <a:ext cx="682253" cy="381947"/>
+          </a:xfrm>
+          <a:prstGeom prst="bentConnector3">
+            <a:avLst>
+              <a:gd name="adj1" fmla="val 27347"/>
+            </a:avLst>
+          </a:prstGeom>
+          <a:ln w="12700">
+            <a:solidFill>
+              <a:srgbClr val="FF0000"/>
+            </a:solidFill>
+            <a:tailEnd type="triangle"/>
+          </a:ln>
+        </p:spPr>
+        <p:style>
+          <a:lnRef idx="1">
+            <a:schemeClr val="accent1"/>
+          </a:lnRef>
+          <a:fillRef idx="0">
+            <a:schemeClr val="accent1"/>
+          </a:fillRef>
+          <a:effectRef idx="0">
+            <a:schemeClr val="accent1"/>
+          </a:effectRef>
+          <a:fontRef idx="minor">
+            <a:schemeClr val="tx1"/>
+          </a:fontRef>
+        </p:style>
+      </p:cxnSp>
+      <p:cxnSp>
+        <p:nvCxnSpPr>
+          <p:cNvPr id="14" name="Conector: angular 13">
+            <a:extLst>
+              <a:ext uri="{FF2B5EF4-FFF2-40B4-BE49-F238E27FC236}">
+                <a16:creationId xmlns:a16="http://schemas.microsoft.com/office/drawing/2014/main" id="{547ED3BE-E553-4F3D-A9EA-87C24DED7CB8}"/>
+              </a:ext>
+            </a:extLst>
+          </p:cNvPr>
+          <p:cNvCxnSpPr>
+            <a:cxnSpLocks/>
+          </p:cNvCxnSpPr>
+          <p:nvPr/>
+        </p:nvCxnSpPr>
+        <p:spPr>
+          <a:xfrm>
+            <a:off x="3388015" y="3507828"/>
+            <a:ext cx="3291360" cy="1654645"/>
+          </a:xfrm>
+          <a:prstGeom prst="bentConnector3">
+            <a:avLst>
+              <a:gd name="adj1" fmla="val 90303"/>
+            </a:avLst>
+          </a:prstGeom>
+          <a:ln w="12700">
+            <a:solidFill>
+              <a:schemeClr val="tx1"/>
+            </a:solidFill>
+            <a:tailEnd type="triangle"/>
+          </a:ln>
+        </p:spPr>
+        <p:style>
+          <a:lnRef idx="1">
+            <a:schemeClr val="accent1"/>
+          </a:lnRef>
+          <a:fillRef idx="0">
+            <a:schemeClr val="accent1"/>
+          </a:fillRef>
+          <a:effectRef idx="0">
+            <a:schemeClr val="accent1"/>
+          </a:effectRef>
+          <a:fontRef idx="minor">
+            <a:schemeClr val="tx1"/>
+          </a:fontRef>
+        </p:style>
+      </p:cxnSp>
+      <p:cxnSp>
+        <p:nvCxnSpPr>
+          <p:cNvPr id="17" name="Conector: angular 16">
+            <a:extLst>
+              <a:ext uri="{FF2B5EF4-FFF2-40B4-BE49-F238E27FC236}">
+                <a16:creationId xmlns:a16="http://schemas.microsoft.com/office/drawing/2014/main" id="{BF04249D-5249-4A84-8044-DFB2BC929381}"/>
+              </a:ext>
+            </a:extLst>
+          </p:cNvPr>
+          <p:cNvCxnSpPr>
+            <a:cxnSpLocks/>
+            <a:endCxn id="6" idx="1"/>
+          </p:cNvCxnSpPr>
+          <p:nvPr/>
+        </p:nvCxnSpPr>
+        <p:spPr>
+          <a:xfrm>
+            <a:off x="3450525" y="3762229"/>
+            <a:ext cx="3228850" cy="1668800"/>
+          </a:xfrm>
+          <a:prstGeom prst="bentConnector3">
+            <a:avLst>
+              <a:gd name="adj1" fmla="val 81910"/>
+            </a:avLst>
+          </a:prstGeom>
+          <a:ln w="12700">
+            <a:solidFill>
+              <a:srgbClr val="00B050"/>
+            </a:solidFill>
+            <a:tailEnd type="triangle"/>
+          </a:ln>
+        </p:spPr>
+        <p:style>
+          <a:lnRef idx="1">
+            <a:schemeClr val="accent1"/>
+          </a:lnRef>
+          <a:fillRef idx="0">
+            <a:schemeClr val="accent1"/>
+          </a:fillRef>
+          <a:effectRef idx="0">
+            <a:schemeClr val="accent1"/>
+          </a:effectRef>
+          <a:fontRef idx="minor">
+            <a:schemeClr val="tx1"/>
+          </a:fontRef>
+        </p:style>
+      </p:cxnSp>
+      <p:cxnSp>
+        <p:nvCxnSpPr>
+          <p:cNvPr id="21" name="Conector: angular 20">
+            <a:extLst>
+              <a:ext uri="{FF2B5EF4-FFF2-40B4-BE49-F238E27FC236}">
+                <a16:creationId xmlns:a16="http://schemas.microsoft.com/office/drawing/2014/main" id="{969E7FB1-2AD9-4EFC-A734-083D6D695596}"/>
+              </a:ext>
+            </a:extLst>
+          </p:cNvPr>
+          <p:cNvCxnSpPr>
+            <a:cxnSpLocks/>
+          </p:cNvCxnSpPr>
+          <p:nvPr/>
+        </p:nvCxnSpPr>
+        <p:spPr>
+          <a:xfrm>
+            <a:off x="3388015" y="3991228"/>
+            <a:ext cx="3862791" cy="2113952"/>
+          </a:xfrm>
+          <a:prstGeom prst="bentConnector3">
+            <a:avLst>
+              <a:gd name="adj1" fmla="val 65337"/>
+            </a:avLst>
+          </a:prstGeom>
+          <a:ln w="12700">
+            <a:solidFill>
+              <a:srgbClr val="FF0000"/>
+            </a:solidFill>
+            <a:tailEnd type="triangle"/>
+          </a:ln>
+        </p:spPr>
+        <p:style>
+          <a:lnRef idx="1">
+            <a:schemeClr val="accent1"/>
+          </a:lnRef>
+          <a:fillRef idx="0">
+            <a:schemeClr val="accent1"/>
+          </a:fillRef>
+          <a:effectRef idx="0">
+            <a:schemeClr val="accent1"/>
+          </a:effectRef>
+          <a:fontRef idx="minor">
+            <a:schemeClr val="tx1"/>
+          </a:fontRef>
+        </p:style>
+      </p:cxnSp>
+      <p:cxnSp>
+        <p:nvCxnSpPr>
+          <p:cNvPr id="25" name="Conector: angular 24">
+            <a:extLst>
+              <a:ext uri="{FF2B5EF4-FFF2-40B4-BE49-F238E27FC236}">
+                <a16:creationId xmlns:a16="http://schemas.microsoft.com/office/drawing/2014/main" id="{4C60193E-BEEF-43A9-A2EB-B0394AEA5EDB}"/>
+              </a:ext>
+            </a:extLst>
+          </p:cNvPr>
+          <p:cNvCxnSpPr>
+            <a:cxnSpLocks/>
+          </p:cNvCxnSpPr>
+          <p:nvPr/>
+        </p:nvCxnSpPr>
+        <p:spPr>
+          <a:xfrm>
+            <a:off x="3395287" y="4213804"/>
+            <a:ext cx="4190369" cy="2120375"/>
+          </a:xfrm>
+          <a:prstGeom prst="bentConnector3">
+            <a:avLst>
+              <a:gd name="adj1" fmla="val 50000"/>
+            </a:avLst>
+          </a:prstGeom>
+          <a:ln>
+            <a:solidFill>
+              <a:srgbClr val="190060"/>
+            </a:solidFill>
+            <a:tailEnd type="triangle"/>
+          </a:ln>
+        </p:spPr>
+        <p:style>
+          <a:lnRef idx="1">
+            <a:schemeClr val="accent1"/>
+          </a:lnRef>
+          <a:fillRef idx="0">
+            <a:schemeClr val="accent1"/>
+          </a:fillRef>
+          <a:effectRef idx="0">
+            <a:schemeClr val="accent1"/>
+          </a:effectRef>
+          <a:fontRef idx="minor">
+            <a:schemeClr val="tx1"/>
+          </a:fontRef>
+        </p:style>
+      </p:cxnSp>
+      <p:cxnSp>
+        <p:nvCxnSpPr>
+          <p:cNvPr id="28" name="Conector: angular 27">
+            <a:extLst>
+              <a:ext uri="{FF2B5EF4-FFF2-40B4-BE49-F238E27FC236}">
+                <a16:creationId xmlns:a16="http://schemas.microsoft.com/office/drawing/2014/main" id="{94565DB2-AB63-4646-94A1-9EF9A78DA23B}"/>
+              </a:ext>
+            </a:extLst>
+          </p:cNvPr>
+          <p:cNvCxnSpPr>
+            <a:cxnSpLocks/>
+          </p:cNvCxnSpPr>
+          <p:nvPr/>
+        </p:nvCxnSpPr>
+        <p:spPr>
+          <a:xfrm>
+            <a:off x="3388014" y="2183174"/>
+            <a:ext cx="3128696" cy="942707"/>
+          </a:xfrm>
+          <a:prstGeom prst="bentConnector3">
+            <a:avLst>
+              <a:gd name="adj1" fmla="val 50000"/>
+            </a:avLst>
+          </a:prstGeom>
+          <a:ln w="12700">
+            <a:solidFill>
+              <a:srgbClr val="FF0000"/>
+            </a:solidFill>
+            <a:tailEnd type="triangle"/>
+          </a:ln>
+        </p:spPr>
+        <p:style>
+          <a:lnRef idx="1">
+            <a:schemeClr val="accent1"/>
+          </a:lnRef>
+          <a:fillRef idx="0">
+            <a:schemeClr val="accent1"/>
+          </a:fillRef>
+          <a:effectRef idx="0">
+            <a:schemeClr val="accent1"/>
+          </a:effectRef>
+          <a:fontRef idx="minor">
+            <a:schemeClr val="tx1"/>
+          </a:fontRef>
+        </p:style>
+      </p:cxnSp>
+      <p:cxnSp>
+        <p:nvCxnSpPr>
+          <p:cNvPr id="30" name="Conector: angular 29">
+            <a:extLst>
+              <a:ext uri="{FF2B5EF4-FFF2-40B4-BE49-F238E27FC236}">
+                <a16:creationId xmlns:a16="http://schemas.microsoft.com/office/drawing/2014/main" id="{2622BD32-B898-4F13-9721-AF3E261AF7DD}"/>
+              </a:ext>
+            </a:extLst>
+          </p:cNvPr>
+          <p:cNvCxnSpPr>
+            <a:cxnSpLocks/>
+          </p:cNvCxnSpPr>
+          <p:nvPr/>
+        </p:nvCxnSpPr>
+        <p:spPr>
+          <a:xfrm>
+            <a:off x="3388013" y="2615846"/>
+            <a:ext cx="3128697" cy="510035"/>
+          </a:xfrm>
+          <a:prstGeom prst="bentConnector3">
+            <a:avLst>
+              <a:gd name="adj1" fmla="val 50000"/>
+            </a:avLst>
+          </a:prstGeom>
+          <a:ln w="12700">
+            <a:solidFill>
+              <a:srgbClr val="FF0000"/>
+            </a:solidFill>
+            <a:tailEnd type="triangle"/>
+          </a:ln>
+        </p:spPr>
+        <p:style>
+          <a:lnRef idx="1">
+            <a:schemeClr val="accent1"/>
+          </a:lnRef>
+          <a:fillRef idx="0">
+            <a:schemeClr val="accent1"/>
+          </a:fillRef>
+          <a:effectRef idx="0">
+            <a:schemeClr val="accent1"/>
+          </a:effectRef>
+          <a:fontRef idx="minor">
+            <a:schemeClr val="tx1"/>
+          </a:fontRef>
+        </p:style>
+      </p:cxnSp>
+      <p:cxnSp>
+        <p:nvCxnSpPr>
+          <p:cNvPr id="32" name="Conector: angular 31">
+            <a:extLst>
+              <a:ext uri="{FF2B5EF4-FFF2-40B4-BE49-F238E27FC236}">
+                <a16:creationId xmlns:a16="http://schemas.microsoft.com/office/drawing/2014/main" id="{97EFC839-CB7F-4F72-BB91-692A44CDEF94}"/>
+              </a:ext>
+            </a:extLst>
+          </p:cNvPr>
+          <p:cNvCxnSpPr>
+            <a:cxnSpLocks/>
+          </p:cNvCxnSpPr>
+          <p:nvPr/>
+        </p:nvCxnSpPr>
+        <p:spPr>
+          <a:xfrm>
+            <a:off x="3388012" y="3061547"/>
+            <a:ext cx="3128698" cy="64334"/>
+          </a:xfrm>
+          <a:prstGeom prst="bentConnector3">
+            <a:avLst>
+              <a:gd name="adj1" fmla="val 50000"/>
+            </a:avLst>
+          </a:prstGeom>
+          <a:ln w="12700">
+            <a:solidFill>
+              <a:srgbClr val="FF0000"/>
+            </a:solidFill>
+            <a:tailEnd type="triangle"/>
+          </a:ln>
+        </p:spPr>
+        <p:style>
+          <a:lnRef idx="1">
+            <a:schemeClr val="accent1"/>
+          </a:lnRef>
+          <a:fillRef idx="0">
+            <a:schemeClr val="accent1"/>
+          </a:fillRef>
+          <a:effectRef idx="0">
+            <a:schemeClr val="accent1"/>
+          </a:effectRef>
+          <a:fontRef idx="minor">
+            <a:schemeClr val="tx1"/>
+          </a:fontRef>
+        </p:style>
+      </p:cxnSp>
+      <p:cxnSp>
+        <p:nvCxnSpPr>
+          <p:cNvPr id="16" name="Conector: angular 15">
+            <a:extLst>
+              <a:ext uri="{FF2B5EF4-FFF2-40B4-BE49-F238E27FC236}">
+                <a16:creationId xmlns:a16="http://schemas.microsoft.com/office/drawing/2014/main" id="{B7CEC4FF-D82C-4CD5-BB89-F03DAD40A566}"/>
+              </a:ext>
+            </a:extLst>
+          </p:cNvPr>
+          <p:cNvCxnSpPr>
+            <a:cxnSpLocks/>
+          </p:cNvCxnSpPr>
+          <p:nvPr/>
+        </p:nvCxnSpPr>
+        <p:spPr>
+          <a:xfrm flipV="1">
+            <a:off x="3388012" y="1962266"/>
+            <a:ext cx="2911641" cy="11359"/>
+          </a:xfrm>
+          <a:prstGeom prst="bentConnector3">
+            <a:avLst>
+              <a:gd name="adj1" fmla="val 50000"/>
+            </a:avLst>
+          </a:prstGeom>
+          <a:ln>
+            <a:tailEnd type="triangle"/>
+          </a:ln>
+        </p:spPr>
+        <p:style>
+          <a:lnRef idx="1">
+            <a:schemeClr val="dk1"/>
+          </a:lnRef>
+          <a:fillRef idx="0">
+            <a:schemeClr val="dk1"/>
+          </a:fillRef>
+          <a:effectRef idx="0">
+            <a:schemeClr val="dk1"/>
+          </a:effectRef>
+          <a:fontRef idx="minor">
+            <a:schemeClr val="tx1"/>
+          </a:fontRef>
+        </p:style>
+      </p:cxnSp>
+      <p:cxnSp>
+        <p:nvCxnSpPr>
+          <p:cNvPr id="18" name="Conector: angular 17">
+            <a:extLst>
+              <a:ext uri="{FF2B5EF4-FFF2-40B4-BE49-F238E27FC236}">
+                <a16:creationId xmlns:a16="http://schemas.microsoft.com/office/drawing/2014/main" id="{C5EC32E0-6B1B-4CC9-9576-F5CF13DCDB2C}"/>
+              </a:ext>
+            </a:extLst>
+          </p:cNvPr>
+          <p:cNvCxnSpPr>
+            <a:cxnSpLocks/>
+          </p:cNvCxnSpPr>
+          <p:nvPr/>
+        </p:nvCxnSpPr>
+        <p:spPr>
+          <a:xfrm flipV="1">
+            <a:off x="3430099" y="2127734"/>
+            <a:ext cx="2880176" cy="278564"/>
+          </a:xfrm>
+          <a:prstGeom prst="bentConnector3">
+            <a:avLst>
+              <a:gd name="adj1" fmla="val 68781"/>
+            </a:avLst>
+          </a:prstGeom>
+          <a:ln>
+            <a:tailEnd type="triangle"/>
+          </a:ln>
+        </p:spPr>
+        <p:style>
+          <a:lnRef idx="1">
+            <a:schemeClr val="accent1"/>
+          </a:lnRef>
+          <a:fillRef idx="0">
+            <a:schemeClr val="accent1"/>
+          </a:fillRef>
+          <a:effectRef idx="0">
+            <a:schemeClr val="accent1"/>
+          </a:effectRef>
+          <a:fontRef idx="minor">
+            <a:schemeClr val="tx1"/>
+          </a:fontRef>
+        </p:style>
+      </p:cxnSp>
+      <p:cxnSp>
+        <p:nvCxnSpPr>
+          <p:cNvPr id="22" name="Conector: angular 21">
+            <a:extLst>
+              <a:ext uri="{FF2B5EF4-FFF2-40B4-BE49-F238E27FC236}">
+                <a16:creationId xmlns:a16="http://schemas.microsoft.com/office/drawing/2014/main" id="{C468AAAD-2C51-42E8-A8D1-D2BF4EC492E9}"/>
+              </a:ext>
+            </a:extLst>
+          </p:cNvPr>
+          <p:cNvCxnSpPr>
+            <a:cxnSpLocks/>
+          </p:cNvCxnSpPr>
+          <p:nvPr/>
+        </p:nvCxnSpPr>
+        <p:spPr>
+          <a:xfrm flipV="1">
+            <a:off x="3450525" y="2319773"/>
+            <a:ext cx="2817662" cy="495759"/>
+          </a:xfrm>
+          <a:prstGeom prst="bentConnector3">
+            <a:avLst>
+              <a:gd name="adj1" fmla="val 75139"/>
+            </a:avLst>
+          </a:prstGeom>
+          <a:ln>
+            <a:solidFill>
+              <a:srgbClr val="00B050"/>
+            </a:solidFill>
+            <a:tailEnd type="triangle"/>
+          </a:ln>
+        </p:spPr>
+        <p:style>
+          <a:lnRef idx="1">
+            <a:schemeClr val="accent1"/>
+          </a:lnRef>
+          <a:fillRef idx="0">
+            <a:schemeClr val="accent1"/>
+          </a:fillRef>
+          <a:effectRef idx="0">
+            <a:schemeClr val="accent1"/>
+          </a:effectRef>
+          <a:fontRef idx="minor">
+            <a:schemeClr val="tx1"/>
+          </a:fontRef>
+        </p:style>
+      </p:cxnSp>
+    </p:spTree>
+    <p:extLst>
+      <p:ext uri="{BB962C8B-B14F-4D97-AF65-F5344CB8AC3E}">
+        <p14:creationId xmlns:p14="http://schemas.microsoft.com/office/powerpoint/2010/main" val="3758172438"/>
       </p:ext>
     </p:extLst>
   </p:cSld>

</xml_diff>

<commit_message>
Put indications in the program and configure pins
</commit_message>
<xml_diff>
--- a/connections/connections.pptx
+++ b/connections/connections.pptx
@@ -12,6 +12,7 @@
     <p:sldId id="260" r:id="rId6"/>
     <p:sldId id="261" r:id="rId7"/>
     <p:sldId id="264" r:id="rId8"/>
+    <p:sldId id="266" r:id="rId9"/>
   </p:sldIdLst>
   <p:sldSz cx="12192000" cy="6858000"/>
   <p:notesSz cx="6858000" cy="9144000"/>
@@ -277,7 +278,7 @@
           <a:p>
             <a:fld id="{07AAE364-0E33-47A9-924B-88C103971447}" type="datetimeFigureOut">
               <a:rPr lang="es-ES" smtClean="0"/>
-              <a:t>18/07/2020</a:t>
+              <a:t>21/07/2020</a:t>
             </a:fld>
             <a:endParaRPr lang="es-ES"/>
           </a:p>
@@ -475,7 +476,7 @@
           <a:p>
             <a:fld id="{07AAE364-0E33-47A9-924B-88C103971447}" type="datetimeFigureOut">
               <a:rPr lang="es-ES" smtClean="0"/>
-              <a:t>18/07/2020</a:t>
+              <a:t>21/07/2020</a:t>
             </a:fld>
             <a:endParaRPr lang="es-ES"/>
           </a:p>
@@ -683,7 +684,7 @@
           <a:p>
             <a:fld id="{07AAE364-0E33-47A9-924B-88C103971447}" type="datetimeFigureOut">
               <a:rPr lang="es-ES" smtClean="0"/>
-              <a:t>18/07/2020</a:t>
+              <a:t>21/07/2020</a:t>
             </a:fld>
             <a:endParaRPr lang="es-ES"/>
           </a:p>
@@ -881,7 +882,7 @@
           <a:p>
             <a:fld id="{07AAE364-0E33-47A9-924B-88C103971447}" type="datetimeFigureOut">
               <a:rPr lang="es-ES" smtClean="0"/>
-              <a:t>18/07/2020</a:t>
+              <a:t>21/07/2020</a:t>
             </a:fld>
             <a:endParaRPr lang="es-ES"/>
           </a:p>
@@ -1156,7 +1157,7 @@
           <a:p>
             <a:fld id="{07AAE364-0E33-47A9-924B-88C103971447}" type="datetimeFigureOut">
               <a:rPr lang="es-ES" smtClean="0"/>
-              <a:t>18/07/2020</a:t>
+              <a:t>21/07/2020</a:t>
             </a:fld>
             <a:endParaRPr lang="es-ES"/>
           </a:p>
@@ -1421,7 +1422,7 @@
           <a:p>
             <a:fld id="{07AAE364-0E33-47A9-924B-88C103971447}" type="datetimeFigureOut">
               <a:rPr lang="es-ES" smtClean="0"/>
-              <a:t>18/07/2020</a:t>
+              <a:t>21/07/2020</a:t>
             </a:fld>
             <a:endParaRPr lang="es-ES"/>
           </a:p>
@@ -1833,7 +1834,7 @@
           <a:p>
             <a:fld id="{07AAE364-0E33-47A9-924B-88C103971447}" type="datetimeFigureOut">
               <a:rPr lang="es-ES" smtClean="0"/>
-              <a:t>18/07/2020</a:t>
+              <a:t>21/07/2020</a:t>
             </a:fld>
             <a:endParaRPr lang="es-ES"/>
           </a:p>
@@ -1974,7 +1975,7 @@
           <a:p>
             <a:fld id="{07AAE364-0E33-47A9-924B-88C103971447}" type="datetimeFigureOut">
               <a:rPr lang="es-ES" smtClean="0"/>
-              <a:t>18/07/2020</a:t>
+              <a:t>21/07/2020</a:t>
             </a:fld>
             <a:endParaRPr lang="es-ES"/>
           </a:p>
@@ -2087,7 +2088,7 @@
           <a:p>
             <a:fld id="{07AAE364-0E33-47A9-924B-88C103971447}" type="datetimeFigureOut">
               <a:rPr lang="es-ES" smtClean="0"/>
-              <a:t>18/07/2020</a:t>
+              <a:t>21/07/2020</a:t>
             </a:fld>
             <a:endParaRPr lang="es-ES"/>
           </a:p>
@@ -2398,7 +2399,7 @@
           <a:p>
             <a:fld id="{07AAE364-0E33-47A9-924B-88C103971447}" type="datetimeFigureOut">
               <a:rPr lang="es-ES" smtClean="0"/>
-              <a:t>18/07/2020</a:t>
+              <a:t>21/07/2020</a:t>
             </a:fld>
             <a:endParaRPr lang="es-ES"/>
           </a:p>
@@ -2686,7 +2687,7 @@
           <a:p>
             <a:fld id="{07AAE364-0E33-47A9-924B-88C103971447}" type="datetimeFigureOut">
               <a:rPr lang="es-ES" smtClean="0"/>
-              <a:t>18/07/2020</a:t>
+              <a:t>21/07/2020</a:t>
             </a:fld>
             <a:endParaRPr lang="es-ES"/>
           </a:p>
@@ -2927,7 +2928,7 @@
           <a:p>
             <a:fld id="{07AAE364-0E33-47A9-924B-88C103971447}" type="datetimeFigureOut">
               <a:rPr lang="es-ES" smtClean="0"/>
-              <a:t>18/07/2020</a:t>
+              <a:t>21/07/2020</a:t>
             </a:fld>
             <a:endParaRPr lang="es-ES"/>
           </a:p>
@@ -3755,10 +3756,10 @@
       </p:cxnSp>
       <p:cxnSp>
         <p:nvCxnSpPr>
-          <p:cNvPr id="28" name="Conector: angular 27">
-            <a:extLst>
-              <a:ext uri="{FF2B5EF4-FFF2-40B4-BE49-F238E27FC236}">
-                <a16:creationId xmlns:a16="http://schemas.microsoft.com/office/drawing/2014/main" id="{94565DB2-AB63-4646-94A1-9EF9A78DA23B}"/>
+          <p:cNvPr id="30" name="Conector: angular 29">
+            <a:extLst>
+              <a:ext uri="{FF2B5EF4-FFF2-40B4-BE49-F238E27FC236}">
+                <a16:creationId xmlns:a16="http://schemas.microsoft.com/office/drawing/2014/main" id="{2622BD32-B898-4F13-9721-AF3E261AF7DD}"/>
               </a:ext>
             </a:extLst>
           </p:cNvPr>
@@ -3769,8 +3770,8 @@
         </p:nvCxnSpPr>
         <p:spPr>
           <a:xfrm flipV="1">
-            <a:off x="3388014" y="686785"/>
-            <a:ext cx="3554458" cy="1496389"/>
+            <a:off x="3388013" y="686785"/>
+            <a:ext cx="3554459" cy="1929061"/>
           </a:xfrm>
           <a:prstGeom prst="bentConnector3">
             <a:avLst>
@@ -3801,10 +3802,10 @@
       </p:cxnSp>
       <p:cxnSp>
         <p:nvCxnSpPr>
-          <p:cNvPr id="30" name="Conector: angular 29">
-            <a:extLst>
-              <a:ext uri="{FF2B5EF4-FFF2-40B4-BE49-F238E27FC236}">
-                <a16:creationId xmlns:a16="http://schemas.microsoft.com/office/drawing/2014/main" id="{2622BD32-B898-4F13-9721-AF3E261AF7DD}"/>
+          <p:cNvPr id="32" name="Conector: angular 31">
+            <a:extLst>
+              <a:ext uri="{FF2B5EF4-FFF2-40B4-BE49-F238E27FC236}">
+                <a16:creationId xmlns:a16="http://schemas.microsoft.com/office/drawing/2014/main" id="{97EFC839-CB7F-4F72-BB91-692A44CDEF94}"/>
               </a:ext>
             </a:extLst>
           </p:cNvPr>
@@ -3815,8 +3816,8 @@
         </p:nvCxnSpPr>
         <p:spPr>
           <a:xfrm flipV="1">
-            <a:off x="3388013" y="686785"/>
-            <a:ext cx="3554459" cy="1929061"/>
+            <a:off x="3388012" y="700926"/>
+            <a:ext cx="3554460" cy="2360621"/>
           </a:xfrm>
           <a:prstGeom prst="bentConnector3">
             <a:avLst>
@@ -3847,10 +3848,10 @@
       </p:cxnSp>
       <p:cxnSp>
         <p:nvCxnSpPr>
-          <p:cNvPr id="32" name="Conector: angular 31">
-            <a:extLst>
-              <a:ext uri="{FF2B5EF4-FFF2-40B4-BE49-F238E27FC236}">
-                <a16:creationId xmlns:a16="http://schemas.microsoft.com/office/drawing/2014/main" id="{97EFC839-CB7F-4F72-BB91-692A44CDEF94}"/>
+          <p:cNvPr id="18" name="Conector: angular 17">
+            <a:extLst>
+              <a:ext uri="{FF2B5EF4-FFF2-40B4-BE49-F238E27FC236}">
+                <a16:creationId xmlns:a16="http://schemas.microsoft.com/office/drawing/2014/main" id="{C5EC32E0-6B1B-4CC9-9576-F5CF13DCDB2C}"/>
               </a:ext>
             </a:extLst>
           </p:cNvPr>
@@ -3861,101 +3862,12 @@
         </p:nvCxnSpPr>
         <p:spPr>
           <a:xfrm flipV="1">
-            <a:off x="3388012" y="700926"/>
-            <a:ext cx="3554460" cy="2360621"/>
+            <a:off x="3450525" y="1229710"/>
+            <a:ext cx="3416697" cy="1163017"/>
           </a:xfrm>
           <a:prstGeom prst="bentConnector3">
             <a:avLst>
-              <a:gd name="adj1" fmla="val 50000"/>
-            </a:avLst>
-          </a:prstGeom>
-          <a:ln w="12700">
-            <a:solidFill>
-              <a:srgbClr val="FF0000"/>
-            </a:solidFill>
-            <a:tailEnd type="triangle"/>
-          </a:ln>
-        </p:spPr>
-        <p:style>
-          <a:lnRef idx="1">
-            <a:schemeClr val="accent1"/>
-          </a:lnRef>
-          <a:fillRef idx="0">
-            <a:schemeClr val="accent1"/>
-          </a:fillRef>
-          <a:effectRef idx="0">
-            <a:schemeClr val="accent1"/>
-          </a:effectRef>
-          <a:fontRef idx="minor">
-            <a:schemeClr val="tx1"/>
-          </a:fontRef>
-        </p:style>
-      </p:cxnSp>
-      <p:cxnSp>
-        <p:nvCxnSpPr>
-          <p:cNvPr id="16" name="Conector: angular 15">
-            <a:extLst>
-              <a:ext uri="{FF2B5EF4-FFF2-40B4-BE49-F238E27FC236}">
-                <a16:creationId xmlns:a16="http://schemas.microsoft.com/office/drawing/2014/main" id="{B7CEC4FF-D82C-4CD5-BB89-F03DAD40A566}"/>
-              </a:ext>
-            </a:extLst>
-          </p:cNvPr>
-          <p:cNvCxnSpPr>
-            <a:cxnSpLocks/>
-          </p:cNvCxnSpPr>
-          <p:nvPr/>
-        </p:nvCxnSpPr>
-        <p:spPr>
-          <a:xfrm flipV="1">
-            <a:off x="3388012" y="1028001"/>
-            <a:ext cx="3554460" cy="945623"/>
-          </a:xfrm>
-          <a:prstGeom prst="bentConnector3">
-            <a:avLst>
-              <a:gd name="adj1" fmla="val 58334"/>
-            </a:avLst>
-          </a:prstGeom>
-          <a:ln>
-            <a:tailEnd type="triangle"/>
-          </a:ln>
-        </p:spPr>
-        <p:style>
-          <a:lnRef idx="1">
-            <a:schemeClr val="dk1"/>
-          </a:lnRef>
-          <a:fillRef idx="0">
-            <a:schemeClr val="dk1"/>
-          </a:fillRef>
-          <a:effectRef idx="0">
-            <a:schemeClr val="dk1"/>
-          </a:effectRef>
-          <a:fontRef idx="minor">
-            <a:schemeClr val="tx1"/>
-          </a:fontRef>
-        </p:style>
-      </p:cxnSp>
-      <p:cxnSp>
-        <p:nvCxnSpPr>
-          <p:cNvPr id="18" name="Conector: angular 17">
-            <a:extLst>
-              <a:ext uri="{FF2B5EF4-FFF2-40B4-BE49-F238E27FC236}">
-                <a16:creationId xmlns:a16="http://schemas.microsoft.com/office/drawing/2014/main" id="{C5EC32E0-6B1B-4CC9-9576-F5CF13DCDB2C}"/>
-              </a:ext>
-            </a:extLst>
-          </p:cNvPr>
-          <p:cNvCxnSpPr>
-            <a:cxnSpLocks/>
-          </p:cNvCxnSpPr>
-          <p:nvPr/>
-        </p:nvCxnSpPr>
-        <p:spPr>
-          <a:xfrm flipV="1">
-            <a:off x="3450525" y="1172450"/>
-            <a:ext cx="3491947" cy="1220275"/>
-          </a:xfrm>
-          <a:prstGeom prst="bentConnector3">
-            <a:avLst>
-              <a:gd name="adj1" fmla="val 63277"/>
+              <a:gd name="adj1" fmla="val 64911"/>
             </a:avLst>
           </a:prstGeom>
           <a:ln>
@@ -4025,10 +3937,10 @@
       </p:cxnSp>
       <p:pic>
         <p:nvPicPr>
-          <p:cNvPr id="2" name="Picture 2" descr="Wireless Energy Monitoring System using ESP32 with Blynk ...">
-            <a:extLst>
-              <a:ext uri="{FF2B5EF4-FFF2-40B4-BE49-F238E27FC236}">
-                <a16:creationId xmlns:a16="http://schemas.microsoft.com/office/drawing/2014/main" id="{7E5C0E54-F98E-40C0-8CDB-A2B42B781F80}"/>
+          <p:cNvPr id="1026" name="Picture 2" descr="Insight Into ESP32 Features &amp; Using It With Arduino IDE ...">
+            <a:extLst>
+              <a:ext uri="{FF2B5EF4-FFF2-40B4-BE49-F238E27FC236}">
+                <a16:creationId xmlns:a16="http://schemas.microsoft.com/office/drawing/2014/main" id="{F880BAE7-A5B1-4AEB-87BD-075CC195862D}"/>
               </a:ext>
             </a:extLst>
           </p:cNvPr>
@@ -4045,13 +3957,13 @@
               </a:ext>
             </a:extLst>
           </a:blip>
-          <a:srcRect l="21303" r="21259"/>
+          <a:srcRect l="18237" r="18250" b="25800"/>
           <a:stretch/>
         </p:blipFill>
         <p:spPr bwMode="auto">
           <a:xfrm>
-            <a:off x="6942472" y="366086"/>
-            <a:ext cx="3862791" cy="3539875"/>
+            <a:off x="6929732" y="372879"/>
+            <a:ext cx="4585636" cy="3307623"/>
           </a:xfrm>
           <a:prstGeom prst="rect">
             <a:avLst/>
@@ -4509,10 +4421,10 @@
       </p:cxnSp>
       <p:cxnSp>
         <p:nvCxnSpPr>
-          <p:cNvPr id="28" name="Conector: angular 27">
-            <a:extLst>
-              <a:ext uri="{FF2B5EF4-FFF2-40B4-BE49-F238E27FC236}">
-                <a16:creationId xmlns:a16="http://schemas.microsoft.com/office/drawing/2014/main" id="{94565DB2-AB63-4646-94A1-9EF9A78DA23B}"/>
+          <p:cNvPr id="30" name="Conector: angular 29">
+            <a:extLst>
+              <a:ext uri="{FF2B5EF4-FFF2-40B4-BE49-F238E27FC236}">
+                <a16:creationId xmlns:a16="http://schemas.microsoft.com/office/drawing/2014/main" id="{2622BD32-B898-4F13-9721-AF3E261AF7DD}"/>
               </a:ext>
             </a:extLst>
           </p:cNvPr>
@@ -4523,8 +4435,8 @@
         </p:nvCxnSpPr>
         <p:spPr>
           <a:xfrm flipV="1">
-            <a:off x="3388014" y="686785"/>
-            <a:ext cx="3554458" cy="1496389"/>
+            <a:off x="3388013" y="686785"/>
+            <a:ext cx="3554459" cy="1929061"/>
           </a:xfrm>
           <a:prstGeom prst="bentConnector3">
             <a:avLst>
@@ -4555,10 +4467,10 @@
       </p:cxnSp>
       <p:cxnSp>
         <p:nvCxnSpPr>
-          <p:cNvPr id="30" name="Conector: angular 29">
-            <a:extLst>
-              <a:ext uri="{FF2B5EF4-FFF2-40B4-BE49-F238E27FC236}">
-                <a16:creationId xmlns:a16="http://schemas.microsoft.com/office/drawing/2014/main" id="{2622BD32-B898-4F13-9721-AF3E261AF7DD}"/>
+          <p:cNvPr id="32" name="Conector: angular 31">
+            <a:extLst>
+              <a:ext uri="{FF2B5EF4-FFF2-40B4-BE49-F238E27FC236}">
+                <a16:creationId xmlns:a16="http://schemas.microsoft.com/office/drawing/2014/main" id="{97EFC839-CB7F-4F72-BB91-692A44CDEF94}"/>
               </a:ext>
             </a:extLst>
           </p:cNvPr>
@@ -4569,8 +4481,8 @@
         </p:nvCxnSpPr>
         <p:spPr>
           <a:xfrm flipV="1">
-            <a:off x="3388013" y="686785"/>
-            <a:ext cx="3554459" cy="1929061"/>
+            <a:off x="3388012" y="700926"/>
+            <a:ext cx="3554460" cy="2360621"/>
           </a:xfrm>
           <a:prstGeom prst="bentConnector3">
             <a:avLst>
@@ -4601,10 +4513,10 @@
       </p:cxnSp>
       <p:cxnSp>
         <p:nvCxnSpPr>
-          <p:cNvPr id="32" name="Conector: angular 31">
-            <a:extLst>
-              <a:ext uri="{FF2B5EF4-FFF2-40B4-BE49-F238E27FC236}">
-                <a16:creationId xmlns:a16="http://schemas.microsoft.com/office/drawing/2014/main" id="{97EFC839-CB7F-4F72-BB91-692A44CDEF94}"/>
+          <p:cNvPr id="18" name="Conector: angular 17">
+            <a:extLst>
+              <a:ext uri="{FF2B5EF4-FFF2-40B4-BE49-F238E27FC236}">
+                <a16:creationId xmlns:a16="http://schemas.microsoft.com/office/drawing/2014/main" id="{C5EC32E0-6B1B-4CC9-9576-F5CF13DCDB2C}"/>
               </a:ext>
             </a:extLst>
           </p:cNvPr>
@@ -4615,101 +4527,12 @@
         </p:nvCxnSpPr>
         <p:spPr>
           <a:xfrm flipV="1">
-            <a:off x="3388012" y="700926"/>
-            <a:ext cx="3554460" cy="2360621"/>
+            <a:off x="3432528" y="1504748"/>
+            <a:ext cx="3497204" cy="901002"/>
           </a:xfrm>
           <a:prstGeom prst="bentConnector3">
             <a:avLst>
-              <a:gd name="adj1" fmla="val 50000"/>
-            </a:avLst>
-          </a:prstGeom>
-          <a:ln w="12700">
-            <a:solidFill>
-              <a:srgbClr val="FF0000"/>
-            </a:solidFill>
-            <a:tailEnd type="triangle"/>
-          </a:ln>
-        </p:spPr>
-        <p:style>
-          <a:lnRef idx="1">
-            <a:schemeClr val="accent1"/>
-          </a:lnRef>
-          <a:fillRef idx="0">
-            <a:schemeClr val="accent1"/>
-          </a:fillRef>
-          <a:effectRef idx="0">
-            <a:schemeClr val="accent1"/>
-          </a:effectRef>
-          <a:fontRef idx="minor">
-            <a:schemeClr val="tx1"/>
-          </a:fontRef>
-        </p:style>
-      </p:cxnSp>
-      <p:cxnSp>
-        <p:nvCxnSpPr>
-          <p:cNvPr id="16" name="Conector: angular 15">
-            <a:extLst>
-              <a:ext uri="{FF2B5EF4-FFF2-40B4-BE49-F238E27FC236}">
-                <a16:creationId xmlns:a16="http://schemas.microsoft.com/office/drawing/2014/main" id="{B7CEC4FF-D82C-4CD5-BB89-F03DAD40A566}"/>
-              </a:ext>
-            </a:extLst>
-          </p:cNvPr>
-          <p:cNvCxnSpPr>
-            <a:cxnSpLocks/>
-          </p:cNvCxnSpPr>
-          <p:nvPr/>
-        </p:nvCxnSpPr>
-        <p:spPr>
-          <a:xfrm flipV="1">
-            <a:off x="3388012" y="1528837"/>
-            <a:ext cx="3554460" cy="444788"/>
-          </a:xfrm>
-          <a:prstGeom prst="bentConnector3">
-            <a:avLst>
-              <a:gd name="adj1" fmla="val 63406"/>
-            </a:avLst>
-          </a:prstGeom>
-          <a:ln>
-            <a:tailEnd type="triangle"/>
-          </a:ln>
-        </p:spPr>
-        <p:style>
-          <a:lnRef idx="1">
-            <a:schemeClr val="dk1"/>
-          </a:lnRef>
-          <a:fillRef idx="0">
-            <a:schemeClr val="dk1"/>
-          </a:fillRef>
-          <a:effectRef idx="0">
-            <a:schemeClr val="dk1"/>
-          </a:effectRef>
-          <a:fontRef idx="minor">
-            <a:schemeClr val="tx1"/>
-          </a:fontRef>
-        </p:style>
-      </p:cxnSp>
-      <p:cxnSp>
-        <p:nvCxnSpPr>
-          <p:cNvPr id="18" name="Conector: angular 17">
-            <a:extLst>
-              <a:ext uri="{FF2B5EF4-FFF2-40B4-BE49-F238E27FC236}">
-                <a16:creationId xmlns:a16="http://schemas.microsoft.com/office/drawing/2014/main" id="{C5EC32E0-6B1B-4CC9-9576-F5CF13DCDB2C}"/>
-              </a:ext>
-            </a:extLst>
-          </p:cNvPr>
-          <p:cNvCxnSpPr>
-            <a:cxnSpLocks/>
-          </p:cNvCxnSpPr>
-          <p:nvPr/>
-        </p:nvCxnSpPr>
-        <p:spPr>
-          <a:xfrm flipV="1">
-            <a:off x="3432528" y="1658374"/>
-            <a:ext cx="3509944" cy="747376"/>
-          </a:xfrm>
-          <a:prstGeom prst="bentConnector3">
-            <a:avLst>
-              <a:gd name="adj1" fmla="val 68713"/>
+              <a:gd name="adj1" fmla="val 67929"/>
             </a:avLst>
           </a:prstGeom>
           <a:ln>
@@ -4747,12 +4570,12 @@
         </p:nvCxnSpPr>
         <p:spPr>
           <a:xfrm flipV="1">
-            <a:off x="3450525" y="1783918"/>
-            <a:ext cx="3491947" cy="1080434"/>
+            <a:off x="3388011" y="1626721"/>
+            <a:ext cx="3554461" cy="1198675"/>
           </a:xfrm>
           <a:prstGeom prst="bentConnector3">
             <a:avLst>
-              <a:gd name="adj1" fmla="val 75448"/>
+              <a:gd name="adj1" fmla="val 73520"/>
             </a:avLst>
           </a:prstGeom>
           <a:ln>
@@ -4779,10 +4602,10 @@
       </p:cxnSp>
       <p:pic>
         <p:nvPicPr>
-          <p:cNvPr id="2" name="Picture 2" descr="Wireless Energy Monitoring System using ESP32 with Blynk ...">
-            <a:extLst>
-              <a:ext uri="{FF2B5EF4-FFF2-40B4-BE49-F238E27FC236}">
-                <a16:creationId xmlns:a16="http://schemas.microsoft.com/office/drawing/2014/main" id="{7E5C0E54-F98E-40C0-8CDB-A2B42B781F80}"/>
+          <p:cNvPr id="3" name="Picture 2" descr="Insight Into ESP32 Features &amp; Using It With Arduino IDE ...">
+            <a:extLst>
+              <a:ext uri="{FF2B5EF4-FFF2-40B4-BE49-F238E27FC236}">
+                <a16:creationId xmlns:a16="http://schemas.microsoft.com/office/drawing/2014/main" id="{23BF5F24-8BC4-4B3C-9A8C-388AF73A7EAA}"/>
               </a:ext>
             </a:extLst>
           </p:cNvPr>
@@ -4799,13 +4622,13 @@
               </a:ext>
             </a:extLst>
           </a:blip>
-          <a:srcRect l="21303" r="21259"/>
+          <a:srcRect l="18237" r="18250" b="25800"/>
           <a:stretch/>
         </p:blipFill>
         <p:spPr bwMode="auto">
           <a:xfrm>
-            <a:off x="6942472" y="366086"/>
-            <a:ext cx="3862791" cy="3539875"/>
+            <a:off x="6929732" y="372879"/>
+            <a:ext cx="4585636" cy="3307623"/>
           </a:xfrm>
           <a:prstGeom prst="rect">
             <a:avLst/>
@@ -5263,10 +5086,10 @@
       </p:cxnSp>
       <p:cxnSp>
         <p:nvCxnSpPr>
-          <p:cNvPr id="28" name="Conector: angular 27">
-            <a:extLst>
-              <a:ext uri="{FF2B5EF4-FFF2-40B4-BE49-F238E27FC236}">
-                <a16:creationId xmlns:a16="http://schemas.microsoft.com/office/drawing/2014/main" id="{94565DB2-AB63-4646-94A1-9EF9A78DA23B}"/>
+          <p:cNvPr id="30" name="Conector: angular 29">
+            <a:extLst>
+              <a:ext uri="{FF2B5EF4-FFF2-40B4-BE49-F238E27FC236}">
+                <a16:creationId xmlns:a16="http://schemas.microsoft.com/office/drawing/2014/main" id="{2622BD32-B898-4F13-9721-AF3E261AF7DD}"/>
               </a:ext>
             </a:extLst>
           </p:cNvPr>
@@ -5277,8 +5100,8 @@
         </p:nvCxnSpPr>
         <p:spPr>
           <a:xfrm flipV="1">
-            <a:off x="3388014" y="686785"/>
-            <a:ext cx="3554458" cy="1496389"/>
+            <a:off x="3388013" y="686785"/>
+            <a:ext cx="3554459" cy="1929061"/>
           </a:xfrm>
           <a:prstGeom prst="bentConnector3">
             <a:avLst>
@@ -5309,10 +5132,10 @@
       </p:cxnSp>
       <p:cxnSp>
         <p:nvCxnSpPr>
-          <p:cNvPr id="30" name="Conector: angular 29">
-            <a:extLst>
-              <a:ext uri="{FF2B5EF4-FFF2-40B4-BE49-F238E27FC236}">
-                <a16:creationId xmlns:a16="http://schemas.microsoft.com/office/drawing/2014/main" id="{2622BD32-B898-4F13-9721-AF3E261AF7DD}"/>
+          <p:cNvPr id="32" name="Conector: angular 31">
+            <a:extLst>
+              <a:ext uri="{FF2B5EF4-FFF2-40B4-BE49-F238E27FC236}">
+                <a16:creationId xmlns:a16="http://schemas.microsoft.com/office/drawing/2014/main" id="{97EFC839-CB7F-4F72-BB91-692A44CDEF94}"/>
               </a:ext>
             </a:extLst>
           </p:cNvPr>
@@ -5323,8 +5146,8 @@
         </p:nvCxnSpPr>
         <p:spPr>
           <a:xfrm flipV="1">
-            <a:off x="3388013" y="686785"/>
-            <a:ext cx="3554459" cy="1929061"/>
+            <a:off x="3388012" y="700926"/>
+            <a:ext cx="3554460" cy="2360621"/>
           </a:xfrm>
           <a:prstGeom prst="bentConnector3">
             <a:avLst>
@@ -5355,10 +5178,10 @@
       </p:cxnSp>
       <p:cxnSp>
         <p:nvCxnSpPr>
-          <p:cNvPr id="32" name="Conector: angular 31">
-            <a:extLst>
-              <a:ext uri="{FF2B5EF4-FFF2-40B4-BE49-F238E27FC236}">
-                <a16:creationId xmlns:a16="http://schemas.microsoft.com/office/drawing/2014/main" id="{97EFC839-CB7F-4F72-BB91-692A44CDEF94}"/>
+          <p:cNvPr id="18" name="Conector: angular 17">
+            <a:extLst>
+              <a:ext uri="{FF2B5EF4-FFF2-40B4-BE49-F238E27FC236}">
+                <a16:creationId xmlns:a16="http://schemas.microsoft.com/office/drawing/2014/main" id="{C5EC32E0-6B1B-4CC9-9576-F5CF13DCDB2C}"/>
               </a:ext>
             </a:extLst>
           </p:cNvPr>
@@ -5369,102 +5192,12 @@
         </p:nvCxnSpPr>
         <p:spPr>
           <a:xfrm flipV="1">
-            <a:off x="3388012" y="700926"/>
-            <a:ext cx="3554460" cy="2360621"/>
+            <a:off x="3450525" y="1801906"/>
+            <a:ext cx="3491947" cy="590820"/>
           </a:xfrm>
           <a:prstGeom prst="bentConnector3">
             <a:avLst>
-              <a:gd name="adj1" fmla="val 50000"/>
-            </a:avLst>
-          </a:prstGeom>
-          <a:ln w="12700">
-            <a:solidFill>
-              <a:srgbClr val="FF0000"/>
-            </a:solidFill>
-            <a:tailEnd type="triangle"/>
-          </a:ln>
-        </p:spPr>
-        <p:style>
-          <a:lnRef idx="1">
-            <a:schemeClr val="accent1"/>
-          </a:lnRef>
-          <a:fillRef idx="0">
-            <a:schemeClr val="accent1"/>
-          </a:fillRef>
-          <a:effectRef idx="0">
-            <a:schemeClr val="accent1"/>
-          </a:effectRef>
-          <a:fontRef idx="minor">
-            <a:schemeClr val="tx1"/>
-          </a:fontRef>
-        </p:style>
-      </p:cxnSp>
-      <p:cxnSp>
-        <p:nvCxnSpPr>
-          <p:cNvPr id="16" name="Conector: angular 15">
-            <a:extLst>
-              <a:ext uri="{FF2B5EF4-FFF2-40B4-BE49-F238E27FC236}">
-                <a16:creationId xmlns:a16="http://schemas.microsoft.com/office/drawing/2014/main" id="{B7CEC4FF-D82C-4CD5-BB89-F03DAD40A566}"/>
-              </a:ext>
-            </a:extLst>
-          </p:cNvPr>
-          <p:cNvCxnSpPr>
-            <a:cxnSpLocks/>
-          </p:cNvCxnSpPr>
-          <p:nvPr/>
-        </p:nvCxnSpPr>
-        <p:spPr>
-          <a:xfrm flipV="1">
-            <a:off x="3388012" y="1973624"/>
-            <a:ext cx="3554460" cy="1"/>
-          </a:xfrm>
-          <a:prstGeom prst="bentConnector3">
-            <a:avLst>
-              <a:gd name="adj1" fmla="val 50000"/>
-            </a:avLst>
-          </a:prstGeom>
-          <a:ln>
-            <a:tailEnd type="triangle"/>
-          </a:ln>
-        </p:spPr>
-        <p:style>
-          <a:lnRef idx="1">
-            <a:schemeClr val="dk1"/>
-          </a:lnRef>
-          <a:fillRef idx="0">
-            <a:schemeClr val="dk1"/>
-          </a:fillRef>
-          <a:effectRef idx="0">
-            <a:schemeClr val="dk1"/>
-          </a:effectRef>
-          <a:fontRef idx="minor">
-            <a:schemeClr val="tx1"/>
-          </a:fontRef>
-        </p:style>
-      </p:cxnSp>
-      <p:cxnSp>
-        <p:nvCxnSpPr>
-          <p:cNvPr id="18" name="Conector: angular 17">
-            <a:extLst>
-              <a:ext uri="{FF2B5EF4-FFF2-40B4-BE49-F238E27FC236}">
-                <a16:creationId xmlns:a16="http://schemas.microsoft.com/office/drawing/2014/main" id="{C5EC32E0-6B1B-4CC9-9576-F5CF13DCDB2C}"/>
-              </a:ext>
-            </a:extLst>
-          </p:cNvPr>
-          <p:cNvCxnSpPr>
-            <a:cxnSpLocks/>
-            <a:endCxn id="2" idx="1"/>
-          </p:cNvCxnSpPr>
-          <p:nvPr/>
-        </p:nvCxnSpPr>
-        <p:spPr>
-          <a:xfrm flipV="1">
-            <a:off x="3450525" y="2136024"/>
-            <a:ext cx="3491947" cy="256702"/>
-          </a:xfrm>
-          <a:prstGeom prst="bentConnector3">
-            <a:avLst>
-              <a:gd name="adj1" fmla="val 71760"/>
+              <a:gd name="adj1" fmla="val 75801"/>
             </a:avLst>
           </a:prstGeom>
           <a:ln>
@@ -5502,12 +5235,12 @@
         </p:nvCxnSpPr>
         <p:spPr>
           <a:xfrm flipV="1">
-            <a:off x="3450525" y="2330526"/>
-            <a:ext cx="3491947" cy="533826"/>
+            <a:off x="3450525" y="1986994"/>
+            <a:ext cx="3491947" cy="877359"/>
           </a:xfrm>
           <a:prstGeom prst="bentConnector3">
             <a:avLst>
-              <a:gd name="adj1" fmla="val 79137"/>
+              <a:gd name="adj1" fmla="val 82732"/>
             </a:avLst>
           </a:prstGeom>
           <a:ln>
@@ -5534,10 +5267,10 @@
       </p:cxnSp>
       <p:pic>
         <p:nvPicPr>
-          <p:cNvPr id="2" name="Picture 2" descr="Wireless Energy Monitoring System using ESP32 with Blynk ...">
-            <a:extLst>
-              <a:ext uri="{FF2B5EF4-FFF2-40B4-BE49-F238E27FC236}">
-                <a16:creationId xmlns:a16="http://schemas.microsoft.com/office/drawing/2014/main" id="{7E5C0E54-F98E-40C0-8CDB-A2B42B781F80}"/>
+          <p:cNvPr id="3" name="Picture 2" descr="Insight Into ESP32 Features &amp; Using It With Arduino IDE ...">
+            <a:extLst>
+              <a:ext uri="{FF2B5EF4-FFF2-40B4-BE49-F238E27FC236}">
+                <a16:creationId xmlns:a16="http://schemas.microsoft.com/office/drawing/2014/main" id="{62E78008-6694-4949-8FCD-8B84B439D07E}"/>
               </a:ext>
             </a:extLst>
           </p:cNvPr>
@@ -5554,13 +5287,13 @@
               </a:ext>
             </a:extLst>
           </a:blip>
-          <a:srcRect l="21303" r="21259"/>
+          <a:srcRect l="18237" r="18250" b="25800"/>
           <a:stretch/>
         </p:blipFill>
         <p:spPr bwMode="auto">
           <a:xfrm>
-            <a:off x="6942472" y="366086"/>
-            <a:ext cx="3862791" cy="3539875"/>
+            <a:off x="6970073" y="359432"/>
+            <a:ext cx="4585636" cy="3307623"/>
           </a:xfrm>
           <a:prstGeom prst="rect">
             <a:avLst/>
@@ -7835,6 +7568,1113 @@
 </p:sld>
 </file>
 
+<file path=ppt/slides/slide8.xml><?xml version="1.0" encoding="utf-8"?>
+<p:sld xmlns:a="http://schemas.openxmlformats.org/drawingml/2006/main" xmlns:r="http://schemas.openxmlformats.org/officeDocument/2006/relationships" xmlns:p="http://schemas.openxmlformats.org/presentationml/2006/main">
+  <p:cSld>
+    <p:spTree>
+      <p:nvGrpSpPr>
+        <p:cNvPr id="1" name=""/>
+        <p:cNvGrpSpPr/>
+        <p:nvPr/>
+      </p:nvGrpSpPr>
+      <p:grpSpPr>
+        <a:xfrm>
+          <a:off x="0" y="0"/>
+          <a:ext cx="0" cy="0"/>
+          <a:chOff x="0" y="0"/>
+          <a:chExt cx="0" cy="0"/>
+        </a:xfrm>
+      </p:grpSpPr>
+      <p:sp>
+        <p:nvSpPr>
+          <p:cNvPr id="2" name="Título 1">
+            <a:extLst>
+              <a:ext uri="{FF2B5EF4-FFF2-40B4-BE49-F238E27FC236}">
+                <a16:creationId xmlns:a16="http://schemas.microsoft.com/office/drawing/2014/main" id="{32186612-4B34-41E9-B422-2E9D920601B4}"/>
+              </a:ext>
+            </a:extLst>
+          </p:cNvPr>
+          <p:cNvSpPr>
+            <a:spLocks noGrp="1"/>
+          </p:cNvSpPr>
+          <p:nvPr>
+            <p:ph type="title"/>
+          </p:nvPr>
+        </p:nvSpPr>
+        <p:spPr/>
+        <p:txBody>
+          <a:bodyPr/>
+          <a:lstStyle/>
+          <a:p>
+            <a:r>
+              <a:rPr lang="es-ES" dirty="0" err="1"/>
+              <a:t>Program</a:t>
+            </a:r>
+            <a:endParaRPr lang="es-ES" dirty="0"/>
+          </a:p>
+        </p:txBody>
+      </p:sp>
+      <p:sp>
+        <p:nvSpPr>
+          <p:cNvPr id="4" name="CuadroTexto 3">
+            <a:extLst>
+              <a:ext uri="{FF2B5EF4-FFF2-40B4-BE49-F238E27FC236}">
+                <a16:creationId xmlns:a16="http://schemas.microsoft.com/office/drawing/2014/main" id="{E3B23348-25B3-4791-A104-5F0C08FE110E}"/>
+              </a:ext>
+            </a:extLst>
+          </p:cNvPr>
+          <p:cNvSpPr txBox="1"/>
+          <p:nvPr/>
+        </p:nvSpPr>
+        <p:spPr>
+          <a:xfrm>
+            <a:off x="838200" y="1422742"/>
+            <a:ext cx="10800806" cy="4524315"/>
+          </a:xfrm>
+          <a:prstGeom prst="rect">
+            <a:avLst/>
+          </a:prstGeom>
+          <a:noFill/>
+        </p:spPr>
+        <p:txBody>
+          <a:bodyPr wrap="square">
+            <a:spAutoFit/>
+          </a:bodyPr>
+          <a:lstStyle/>
+          <a:p>
+            <a:r>
+              <a:rPr lang="es-ES" dirty="0" err="1"/>
+              <a:t>The</a:t>
+            </a:r>
+            <a:r>
+              <a:rPr lang="es-ES" dirty="0"/>
+              <a:t> </a:t>
+            </a:r>
+            <a:r>
+              <a:rPr lang="es-ES" dirty="0" err="1"/>
+              <a:t>program</a:t>
+            </a:r>
+            <a:r>
+              <a:rPr lang="es-ES" dirty="0"/>
+              <a:t> </a:t>
+            </a:r>
+            <a:r>
+              <a:rPr lang="es-ES" dirty="0" err="1"/>
+              <a:t>is</a:t>
+            </a:r>
+            <a:r>
+              <a:rPr lang="es-ES" dirty="0"/>
+              <a:t> </a:t>
+            </a:r>
+            <a:r>
+              <a:rPr lang="es-ES" dirty="0" err="1"/>
+              <a:t>configured</a:t>
+            </a:r>
+            <a:r>
+              <a:rPr lang="es-ES" dirty="0"/>
+              <a:t> as </a:t>
+            </a:r>
+            <a:r>
+              <a:rPr lang="es-ES" dirty="0" err="1"/>
+              <a:t>indicated</a:t>
+            </a:r>
+            <a:r>
+              <a:rPr lang="es-ES" dirty="0"/>
+              <a:t> </a:t>
+            </a:r>
+            <a:r>
+              <a:rPr lang="es-ES" dirty="0" err="1"/>
+              <a:t>by</a:t>
+            </a:r>
+            <a:r>
+              <a:rPr lang="es-ES" dirty="0"/>
+              <a:t> </a:t>
+            </a:r>
+            <a:r>
+              <a:rPr lang="es-ES" dirty="0" err="1"/>
+              <a:t>the</a:t>
+            </a:r>
+            <a:r>
+              <a:rPr lang="es-ES" dirty="0"/>
+              <a:t> 30-pin ESP32.</a:t>
+            </a:r>
+          </a:p>
+          <a:p>
+            <a:endParaRPr lang="es-ES" dirty="0"/>
+          </a:p>
+          <a:p>
+            <a:r>
+              <a:rPr lang="es-ES" dirty="0" err="1"/>
+              <a:t>If</a:t>
+            </a:r>
+            <a:r>
+              <a:rPr lang="es-ES" dirty="0"/>
+              <a:t> </a:t>
+            </a:r>
+            <a:r>
+              <a:rPr lang="es-ES" dirty="0" err="1"/>
+              <a:t>you</a:t>
+            </a:r>
+            <a:r>
+              <a:rPr lang="es-ES" dirty="0"/>
+              <a:t> </a:t>
+            </a:r>
+            <a:r>
+              <a:rPr lang="es-ES" dirty="0" err="1"/>
+              <a:t>already</a:t>
+            </a:r>
+            <a:r>
+              <a:rPr lang="es-ES" dirty="0"/>
+              <a:t> </a:t>
+            </a:r>
+            <a:r>
+              <a:rPr lang="es-ES" dirty="0" err="1"/>
+              <a:t>have</a:t>
+            </a:r>
+            <a:r>
+              <a:rPr lang="es-ES" dirty="0"/>
+              <a:t> a </a:t>
+            </a:r>
+            <a:r>
+              <a:rPr lang="es-ES" dirty="0" err="1"/>
+              <a:t>connection</a:t>
+            </a:r>
+            <a:r>
+              <a:rPr lang="es-ES" dirty="0"/>
+              <a:t> </a:t>
+            </a:r>
+            <a:r>
+              <a:rPr lang="es-ES" dirty="0" err="1"/>
+              <a:t>we</a:t>
+            </a:r>
+            <a:r>
+              <a:rPr lang="es-ES" dirty="0"/>
+              <a:t> </a:t>
+            </a:r>
+            <a:r>
+              <a:rPr lang="es-ES" dirty="0" err="1"/>
+              <a:t>only</a:t>
+            </a:r>
+            <a:r>
+              <a:rPr lang="es-ES" dirty="0"/>
+              <a:t> </a:t>
+            </a:r>
+            <a:r>
+              <a:rPr lang="es-ES" dirty="0" err="1"/>
+              <a:t>have</a:t>
+            </a:r>
+            <a:r>
+              <a:rPr lang="es-ES" dirty="0"/>
+              <a:t> </a:t>
+            </a:r>
+            <a:r>
+              <a:rPr lang="es-ES" dirty="0" err="1"/>
+              <a:t>to</a:t>
+            </a:r>
+            <a:r>
+              <a:rPr lang="es-ES" dirty="0"/>
+              <a:t> </a:t>
+            </a:r>
+            <a:r>
+              <a:rPr lang="es-ES" dirty="0" err="1"/>
+              <a:t>change</a:t>
+            </a:r>
+            <a:r>
+              <a:rPr lang="es-ES" dirty="0"/>
+              <a:t> </a:t>
+            </a:r>
+            <a:r>
+              <a:rPr lang="es-ES" dirty="0" err="1"/>
+              <a:t>the</a:t>
+            </a:r>
+            <a:r>
+              <a:rPr lang="es-ES" dirty="0"/>
+              <a:t> </a:t>
+            </a:r>
+            <a:r>
+              <a:rPr lang="es-ES" dirty="0" err="1"/>
+              <a:t>pins</a:t>
+            </a:r>
+            <a:r>
+              <a:rPr lang="es-ES" dirty="0"/>
+              <a:t> and at </a:t>
+            </a:r>
+            <a:r>
+              <a:rPr lang="es-ES" dirty="0" err="1"/>
+              <a:t>the</a:t>
+            </a:r>
+            <a:r>
+              <a:rPr lang="es-ES" dirty="0"/>
+              <a:t> time </a:t>
+            </a:r>
+            <a:r>
+              <a:rPr lang="es-ES" dirty="0" err="1"/>
+              <a:t>of</a:t>
+            </a:r>
+            <a:r>
+              <a:rPr lang="es-ES" dirty="0"/>
+              <a:t> </a:t>
+            </a:r>
+            <a:r>
+              <a:rPr lang="es-ES" dirty="0" err="1"/>
+              <a:t>adapting</a:t>
+            </a:r>
+            <a:r>
+              <a:rPr lang="es-ES" dirty="0"/>
+              <a:t> </a:t>
+            </a:r>
+            <a:r>
+              <a:rPr lang="es-ES" dirty="0" err="1"/>
+              <a:t>it</a:t>
+            </a:r>
+            <a:r>
+              <a:rPr lang="es-ES" dirty="0"/>
+              <a:t>, </a:t>
+            </a:r>
+            <a:r>
+              <a:rPr lang="es-ES" dirty="0" err="1"/>
+              <a:t>see</a:t>
+            </a:r>
+            <a:r>
+              <a:rPr lang="es-ES" dirty="0"/>
+              <a:t> </a:t>
+            </a:r>
+            <a:r>
+              <a:rPr lang="es-ES" dirty="0" err="1"/>
+              <a:t>that</a:t>
+            </a:r>
+            <a:r>
+              <a:rPr lang="es-ES" dirty="0"/>
+              <a:t> </a:t>
+            </a:r>
+            <a:r>
+              <a:rPr lang="es-ES" dirty="0" err="1"/>
+              <a:t>it</a:t>
+            </a:r>
+            <a:r>
+              <a:rPr lang="es-ES" dirty="0"/>
+              <a:t> </a:t>
+            </a:r>
+            <a:r>
+              <a:rPr lang="es-ES" dirty="0" err="1"/>
+              <a:t>is</a:t>
+            </a:r>
+            <a:r>
+              <a:rPr lang="es-ES" dirty="0"/>
+              <a:t> </a:t>
+            </a:r>
+            <a:r>
+              <a:rPr lang="es-ES" dirty="0" err="1"/>
+              <a:t>actually</a:t>
+            </a:r>
+            <a:r>
+              <a:rPr lang="es-ES" dirty="0"/>
+              <a:t> </a:t>
+            </a:r>
+            <a:r>
+              <a:rPr lang="es-ES" dirty="0" err="1"/>
+              <a:t>opening</a:t>
+            </a:r>
+            <a:r>
+              <a:rPr lang="es-ES" dirty="0"/>
+              <a:t> and </a:t>
+            </a:r>
+            <a:r>
+              <a:rPr lang="es-ES" dirty="0" err="1"/>
+              <a:t>closing</a:t>
+            </a:r>
+            <a:r>
+              <a:rPr lang="es-ES" dirty="0"/>
+              <a:t> </a:t>
+            </a:r>
+            <a:r>
+              <a:rPr lang="es-ES" dirty="0" err="1"/>
+              <a:t>the</a:t>
+            </a:r>
+            <a:r>
+              <a:rPr lang="es-ES" dirty="0"/>
+              <a:t> </a:t>
+            </a:r>
+            <a:r>
+              <a:rPr lang="es-ES" dirty="0" err="1"/>
+              <a:t>valve</a:t>
+            </a:r>
+            <a:r>
+              <a:rPr lang="es-ES" dirty="0"/>
+              <a:t> </a:t>
+            </a:r>
+            <a:r>
+              <a:rPr lang="es-ES" dirty="0" err="1"/>
+              <a:t>when</a:t>
+            </a:r>
+            <a:r>
+              <a:rPr lang="es-ES" dirty="0"/>
+              <a:t> </a:t>
+            </a:r>
+            <a:r>
+              <a:rPr lang="es-ES" dirty="0" err="1"/>
+              <a:t>the</a:t>
+            </a:r>
+            <a:r>
+              <a:rPr lang="es-ES" dirty="0"/>
+              <a:t> </a:t>
+            </a:r>
+            <a:r>
+              <a:rPr lang="es-ES" dirty="0" err="1"/>
+              <a:t>instruction</a:t>
+            </a:r>
+            <a:r>
+              <a:rPr lang="es-ES" dirty="0"/>
+              <a:t> </a:t>
+            </a:r>
+            <a:r>
+              <a:rPr lang="es-ES" dirty="0" err="1"/>
+              <a:t>is</a:t>
+            </a:r>
+            <a:r>
+              <a:rPr lang="es-ES" dirty="0"/>
+              <a:t> </a:t>
+            </a:r>
+            <a:r>
+              <a:rPr lang="es-ES" dirty="0" err="1"/>
+              <a:t>sent</a:t>
+            </a:r>
+            <a:r>
+              <a:rPr lang="es-ES" dirty="0"/>
+              <a:t> </a:t>
+            </a:r>
+            <a:r>
+              <a:rPr lang="es-ES" dirty="0" err="1"/>
+              <a:t>if</a:t>
+            </a:r>
+            <a:r>
+              <a:rPr lang="es-ES" dirty="0"/>
+              <a:t> </a:t>
+            </a:r>
+            <a:r>
+              <a:rPr lang="es-ES" dirty="0" err="1"/>
+              <a:t>the</a:t>
+            </a:r>
+            <a:r>
+              <a:rPr lang="es-ES" dirty="0"/>
+              <a:t> </a:t>
+            </a:r>
+            <a:r>
+              <a:rPr lang="es-ES" dirty="0" err="1"/>
+              <a:t>address</a:t>
+            </a:r>
+            <a:r>
+              <a:rPr lang="es-ES" dirty="0"/>
+              <a:t> </a:t>
+            </a:r>
+            <a:r>
+              <a:rPr lang="es-ES" dirty="0" err="1"/>
+              <a:t>must</a:t>
+            </a:r>
+            <a:r>
+              <a:rPr lang="es-ES" dirty="0"/>
+              <a:t> </a:t>
+            </a:r>
+            <a:r>
+              <a:rPr lang="es-ES" dirty="0" err="1"/>
+              <a:t>not</a:t>
+            </a:r>
+            <a:r>
+              <a:rPr lang="es-ES" dirty="0"/>
+              <a:t> be </a:t>
+            </a:r>
+            <a:r>
+              <a:rPr lang="es-ES" dirty="0" err="1"/>
+              <a:t>changed</a:t>
+            </a:r>
+            <a:r>
+              <a:rPr lang="es-ES" dirty="0"/>
+              <a:t> in </a:t>
+            </a:r>
+            <a:r>
+              <a:rPr lang="es-ES" dirty="0" err="1"/>
+              <a:t>the</a:t>
+            </a:r>
+            <a:r>
+              <a:rPr lang="es-ES" dirty="0"/>
+              <a:t> </a:t>
+            </a:r>
+            <a:r>
+              <a:rPr lang="es-ES" dirty="0" err="1"/>
+              <a:t>opening</a:t>
+            </a:r>
+            <a:r>
+              <a:rPr lang="es-ES" dirty="0"/>
+              <a:t> and </a:t>
+            </a:r>
+            <a:r>
+              <a:rPr lang="es-ES" dirty="0" err="1"/>
+              <a:t>closing</a:t>
+            </a:r>
+            <a:r>
+              <a:rPr lang="es-ES" dirty="0"/>
+              <a:t> </a:t>
+            </a:r>
+            <a:r>
+              <a:rPr lang="es-ES" dirty="0" err="1"/>
+              <a:t>functions</a:t>
+            </a:r>
+            <a:r>
+              <a:rPr lang="es-ES" dirty="0"/>
+              <a:t>.</a:t>
+            </a:r>
+          </a:p>
+          <a:p>
+            <a:r>
+              <a:rPr lang="es-ES" dirty="0" err="1"/>
+              <a:t>The</a:t>
+            </a:r>
+            <a:r>
+              <a:rPr lang="es-ES" dirty="0"/>
+              <a:t> </a:t>
+            </a:r>
+            <a:r>
+              <a:rPr lang="es-ES" dirty="0" err="1"/>
+              <a:t>program</a:t>
+            </a:r>
+            <a:r>
+              <a:rPr lang="es-ES" dirty="0"/>
+              <a:t> </a:t>
+            </a:r>
+            <a:r>
+              <a:rPr lang="es-ES" dirty="0" err="1"/>
+              <a:t>is</a:t>
+            </a:r>
+            <a:r>
+              <a:rPr lang="es-ES" dirty="0"/>
+              <a:t> </a:t>
+            </a:r>
+            <a:r>
+              <a:rPr lang="es-ES" dirty="0" err="1"/>
+              <a:t>functional</a:t>
+            </a:r>
+            <a:r>
+              <a:rPr lang="es-ES" dirty="0"/>
+              <a:t>.</a:t>
+            </a:r>
+          </a:p>
+          <a:p>
+            <a:endParaRPr lang="es-ES" dirty="0"/>
+          </a:p>
+          <a:p>
+            <a:r>
+              <a:rPr lang="es-ES" dirty="0" err="1"/>
+              <a:t>Ypu</a:t>
+            </a:r>
+            <a:r>
+              <a:rPr lang="es-ES" dirty="0"/>
+              <a:t> </a:t>
+            </a:r>
+            <a:r>
+              <a:rPr lang="es-ES" dirty="0" err="1"/>
+              <a:t>must</a:t>
+            </a:r>
+            <a:r>
+              <a:rPr lang="es-ES" dirty="0"/>
+              <a:t> </a:t>
+            </a:r>
+            <a:r>
+              <a:rPr lang="es-ES" dirty="0" err="1"/>
+              <a:t>enter</a:t>
+            </a:r>
+            <a:r>
+              <a:rPr lang="es-ES" dirty="0"/>
+              <a:t> </a:t>
+            </a:r>
+            <a:r>
+              <a:rPr lang="es-ES" dirty="0" err="1"/>
+              <a:t>the</a:t>
+            </a:r>
+            <a:r>
+              <a:rPr lang="es-ES" dirty="0"/>
+              <a:t> </a:t>
+            </a:r>
+            <a:r>
+              <a:rPr lang="es-ES" dirty="0" err="1"/>
+              <a:t>valve</a:t>
+            </a:r>
+            <a:r>
+              <a:rPr lang="es-ES" dirty="0"/>
+              <a:t> </a:t>
+            </a:r>
+            <a:r>
+              <a:rPr lang="es-ES" dirty="0" err="1"/>
+              <a:t>to</a:t>
+            </a:r>
+            <a:r>
+              <a:rPr lang="es-ES" dirty="0"/>
+              <a:t> be </a:t>
+            </a:r>
+            <a:r>
+              <a:rPr lang="es-ES" dirty="0" err="1"/>
+              <a:t>operated</a:t>
+            </a:r>
+            <a:r>
+              <a:rPr lang="es-ES" dirty="0"/>
+              <a:t> </a:t>
+            </a:r>
+            <a:r>
+              <a:rPr lang="es-ES" dirty="0" err="1"/>
+              <a:t>with</a:t>
+            </a:r>
+            <a:r>
+              <a:rPr lang="es-ES" dirty="0"/>
+              <a:t> </a:t>
+            </a:r>
+            <a:r>
+              <a:rPr lang="es-ES" dirty="0" err="1"/>
+              <a:t>the</a:t>
+            </a:r>
+            <a:r>
+              <a:rPr lang="es-ES" dirty="0"/>
+              <a:t> </a:t>
+            </a:r>
+            <a:r>
+              <a:rPr lang="es-ES" dirty="0" err="1"/>
+              <a:t>angle</a:t>
+            </a:r>
+            <a:r>
+              <a:rPr lang="es-ES" dirty="0"/>
+              <a:t> </a:t>
+            </a:r>
+            <a:r>
+              <a:rPr lang="es-ES" dirty="0" err="1"/>
+              <a:t>separated</a:t>
+            </a:r>
+            <a:r>
+              <a:rPr lang="es-ES" dirty="0"/>
+              <a:t> </a:t>
+            </a:r>
+            <a:r>
+              <a:rPr lang="es-ES" dirty="0" err="1"/>
+              <a:t>by</a:t>
+            </a:r>
+            <a:r>
+              <a:rPr lang="es-ES" dirty="0"/>
+              <a:t> a </a:t>
+            </a:r>
+            <a:r>
+              <a:rPr lang="es-ES" dirty="0" err="1"/>
+              <a:t>comma</a:t>
+            </a:r>
+            <a:r>
+              <a:rPr lang="es-ES" dirty="0"/>
+              <a:t>, </a:t>
+            </a:r>
+            <a:r>
+              <a:rPr lang="es-ES" dirty="0" err="1"/>
+              <a:t>Example</a:t>
+            </a:r>
+            <a:r>
+              <a:rPr lang="es-ES" dirty="0"/>
+              <a:t>:</a:t>
+            </a:r>
+          </a:p>
+          <a:p>
+            <a:r>
+              <a:rPr lang="es-ES" dirty="0" err="1"/>
+              <a:t>If</a:t>
+            </a:r>
+            <a:r>
+              <a:rPr lang="es-ES" dirty="0"/>
+              <a:t> I </a:t>
+            </a:r>
+            <a:r>
+              <a:rPr lang="es-ES" dirty="0" err="1"/>
+              <a:t>want</a:t>
+            </a:r>
+            <a:r>
+              <a:rPr lang="es-ES" dirty="0"/>
+              <a:t> </a:t>
+            </a:r>
+            <a:r>
+              <a:rPr lang="es-ES" dirty="0" err="1"/>
+              <a:t>to</a:t>
+            </a:r>
+            <a:r>
+              <a:rPr lang="es-ES" dirty="0"/>
+              <a:t> </a:t>
+            </a:r>
+            <a:r>
+              <a:rPr lang="es-ES" dirty="0" err="1"/>
+              <a:t>move</a:t>
+            </a:r>
+            <a:r>
+              <a:rPr lang="es-ES" dirty="0"/>
+              <a:t> </a:t>
+            </a:r>
+            <a:r>
+              <a:rPr lang="es-ES" dirty="0" err="1"/>
+              <a:t>valve</a:t>
+            </a:r>
+            <a:r>
+              <a:rPr lang="es-ES" dirty="0"/>
+              <a:t> 2 </a:t>
+            </a:r>
+            <a:r>
+              <a:rPr lang="es-ES" dirty="0" err="1"/>
+              <a:t>to</a:t>
+            </a:r>
+            <a:r>
+              <a:rPr lang="es-ES" dirty="0"/>
+              <a:t> </a:t>
+            </a:r>
+            <a:r>
+              <a:rPr lang="es-ES" dirty="0" err="1"/>
+              <a:t>the</a:t>
+            </a:r>
+            <a:r>
+              <a:rPr lang="es-ES" dirty="0"/>
+              <a:t> 75-degree position </a:t>
+            </a:r>
+            <a:r>
+              <a:rPr lang="es-ES" dirty="0" err="1"/>
+              <a:t>you</a:t>
+            </a:r>
+            <a:r>
+              <a:rPr lang="es-ES" dirty="0"/>
+              <a:t> </a:t>
+            </a:r>
+            <a:r>
+              <a:rPr lang="es-ES" dirty="0" err="1"/>
+              <a:t>should</a:t>
+            </a:r>
+            <a:r>
+              <a:rPr lang="es-ES" dirty="0"/>
+              <a:t> </a:t>
+            </a:r>
+            <a:r>
+              <a:rPr lang="es-ES" dirty="0" err="1"/>
+              <a:t>send</a:t>
+            </a:r>
+            <a:r>
+              <a:rPr lang="es-ES" dirty="0"/>
+              <a:t>: </a:t>
+            </a:r>
+            <a:r>
+              <a:rPr lang="es-ES" b="1" dirty="0"/>
+              <a:t>2,75.</a:t>
+            </a:r>
+          </a:p>
+          <a:p>
+            <a:endParaRPr lang="es-ES" b="1" dirty="0"/>
+          </a:p>
+          <a:p>
+            <a:r>
+              <a:rPr lang="es-ES" dirty="0"/>
+              <a:t>I </a:t>
+            </a:r>
+            <a:r>
+              <a:rPr lang="es-ES" dirty="0" err="1"/>
+              <a:t>think</a:t>
+            </a:r>
+            <a:r>
+              <a:rPr lang="es-ES" dirty="0"/>
+              <a:t> </a:t>
+            </a:r>
+            <a:r>
+              <a:rPr lang="es-ES" dirty="0" err="1"/>
+              <a:t>you</a:t>
+            </a:r>
+            <a:r>
+              <a:rPr lang="es-ES" dirty="0"/>
+              <a:t> </a:t>
+            </a:r>
+            <a:r>
+              <a:rPr lang="es-ES" dirty="0" err="1"/>
+              <a:t>could</a:t>
+            </a:r>
+            <a:r>
+              <a:rPr lang="es-ES" dirty="0"/>
+              <a:t> </a:t>
+            </a:r>
+            <a:r>
+              <a:rPr lang="es-ES" dirty="0" err="1"/>
+              <a:t>increase</a:t>
+            </a:r>
+            <a:r>
+              <a:rPr lang="es-ES" dirty="0"/>
+              <a:t> a safety </a:t>
+            </a:r>
+            <a:r>
+              <a:rPr lang="es-ES" dirty="0" err="1"/>
+              <a:t>measure</a:t>
+            </a:r>
+            <a:r>
+              <a:rPr lang="es-ES" dirty="0"/>
+              <a:t> </a:t>
+            </a:r>
+            <a:r>
+              <a:rPr lang="es-ES" dirty="0" err="1"/>
+              <a:t>of</a:t>
+            </a:r>
+            <a:r>
+              <a:rPr lang="es-ES" dirty="0"/>
+              <a:t> </a:t>
+            </a:r>
+            <a:r>
+              <a:rPr lang="es-ES" dirty="0" err="1"/>
+              <a:t>the</a:t>
+            </a:r>
+            <a:r>
+              <a:rPr lang="es-ES" dirty="0"/>
+              <a:t> </a:t>
+            </a:r>
+            <a:r>
+              <a:rPr lang="es-ES" dirty="0" err="1"/>
+              <a:t>maximum</a:t>
+            </a:r>
+            <a:r>
+              <a:rPr lang="es-ES" dirty="0"/>
+              <a:t> </a:t>
+            </a:r>
+            <a:r>
+              <a:rPr lang="es-ES" dirty="0" err="1"/>
+              <a:t>degree</a:t>
+            </a:r>
+            <a:r>
+              <a:rPr lang="es-ES" dirty="0"/>
+              <a:t> </a:t>
+            </a:r>
+            <a:r>
+              <a:rPr lang="es-ES" dirty="0" err="1"/>
+              <a:t>of</a:t>
+            </a:r>
+            <a:r>
+              <a:rPr lang="es-ES" dirty="0"/>
+              <a:t> </a:t>
+            </a:r>
+            <a:r>
+              <a:rPr lang="es-ES" dirty="0" err="1"/>
+              <a:t>opening</a:t>
+            </a:r>
+            <a:r>
+              <a:rPr lang="es-ES" dirty="0"/>
+              <a:t> and </a:t>
+            </a:r>
+            <a:r>
+              <a:rPr lang="es-ES" dirty="0" err="1"/>
+              <a:t>closing</a:t>
+            </a:r>
+            <a:r>
+              <a:rPr lang="es-ES" dirty="0"/>
+              <a:t> </a:t>
+            </a:r>
+            <a:r>
+              <a:rPr lang="es-ES" dirty="0" err="1"/>
+              <a:t>by</a:t>
+            </a:r>
+            <a:r>
+              <a:rPr lang="es-ES" dirty="0"/>
+              <a:t> </a:t>
+            </a:r>
+            <a:r>
+              <a:rPr lang="es-ES" dirty="0" err="1"/>
+              <a:t>looking</a:t>
+            </a:r>
+            <a:r>
+              <a:rPr lang="es-ES" dirty="0"/>
+              <a:t> at </a:t>
+            </a:r>
+            <a:r>
+              <a:rPr lang="es-ES" dirty="0" err="1"/>
+              <a:t>the</a:t>
+            </a:r>
+            <a:r>
+              <a:rPr lang="es-ES" dirty="0"/>
+              <a:t> </a:t>
+            </a:r>
+            <a:r>
+              <a:rPr lang="es-ES" dirty="0" err="1"/>
+              <a:t>degrees</a:t>
+            </a:r>
+            <a:r>
+              <a:rPr lang="es-ES" dirty="0"/>
+              <a:t> </a:t>
+            </a:r>
+            <a:r>
+              <a:rPr lang="es-ES" dirty="0" err="1"/>
+              <a:t>of</a:t>
+            </a:r>
+            <a:r>
+              <a:rPr lang="es-ES" dirty="0"/>
+              <a:t> </a:t>
+            </a:r>
+            <a:r>
+              <a:rPr lang="es-ES" dirty="0" err="1"/>
+              <a:t>valve</a:t>
+            </a:r>
+            <a:r>
+              <a:rPr lang="es-ES" dirty="0"/>
+              <a:t> </a:t>
+            </a:r>
+            <a:r>
+              <a:rPr lang="es-ES" dirty="0" err="1"/>
+              <a:t>opening</a:t>
+            </a:r>
+            <a:r>
+              <a:rPr lang="es-ES" dirty="0"/>
+              <a:t>.</a:t>
+            </a:r>
+          </a:p>
+          <a:p>
+            <a:endParaRPr lang="es-ES" dirty="0"/>
+          </a:p>
+          <a:p>
+            <a:r>
+              <a:rPr lang="es-ES" dirty="0"/>
+              <a:t>I can </a:t>
+            </a:r>
+            <a:r>
+              <a:rPr lang="es-ES" dirty="0" err="1"/>
+              <a:t>add</a:t>
+            </a:r>
+            <a:r>
+              <a:rPr lang="es-ES" dirty="0"/>
+              <a:t> </a:t>
+            </a:r>
+            <a:r>
+              <a:rPr lang="es-ES" dirty="0" err="1"/>
+              <a:t>that</a:t>
+            </a:r>
+            <a:r>
+              <a:rPr lang="es-ES" dirty="0"/>
+              <a:t> </a:t>
+            </a:r>
+            <a:r>
+              <a:rPr lang="es-ES" dirty="0" err="1"/>
+              <a:t>when</a:t>
+            </a:r>
+            <a:r>
+              <a:rPr lang="es-ES" dirty="0"/>
+              <a:t> </a:t>
+            </a:r>
+            <a:r>
+              <a:rPr lang="es-ES" dirty="0" err="1"/>
+              <a:t>observing</a:t>
+            </a:r>
+            <a:r>
+              <a:rPr lang="es-ES" dirty="0"/>
+              <a:t> </a:t>
+            </a:r>
+            <a:r>
+              <a:rPr lang="es-ES" dirty="0" err="1"/>
+              <a:t>the</a:t>
+            </a:r>
+            <a:r>
+              <a:rPr lang="es-ES" dirty="0"/>
+              <a:t> </a:t>
+            </a:r>
+            <a:r>
+              <a:rPr lang="es-ES" dirty="0" err="1"/>
+              <a:t>necessary</a:t>
+            </a:r>
+            <a:r>
+              <a:rPr lang="es-ES" dirty="0"/>
+              <a:t> </a:t>
+            </a:r>
+            <a:r>
+              <a:rPr lang="es-ES" dirty="0" err="1"/>
+              <a:t>changes</a:t>
+            </a:r>
+            <a:r>
+              <a:rPr lang="es-ES" dirty="0"/>
+              <a:t> once </a:t>
+            </a:r>
+            <a:r>
+              <a:rPr lang="es-ES" dirty="0" err="1"/>
+              <a:t>the</a:t>
+            </a:r>
+            <a:r>
+              <a:rPr lang="es-ES" dirty="0"/>
+              <a:t> </a:t>
+            </a:r>
+            <a:r>
+              <a:rPr lang="es-ES" dirty="0" err="1"/>
+              <a:t>system</a:t>
+            </a:r>
+            <a:r>
+              <a:rPr lang="es-ES" dirty="0"/>
+              <a:t> has </a:t>
+            </a:r>
+            <a:r>
+              <a:rPr lang="es-ES" dirty="0" err="1"/>
+              <a:t>been</a:t>
+            </a:r>
+            <a:r>
+              <a:rPr lang="es-ES" dirty="0"/>
+              <a:t> </a:t>
+            </a:r>
+            <a:r>
+              <a:rPr lang="es-ES" dirty="0" err="1"/>
+              <a:t>tested</a:t>
+            </a:r>
+            <a:r>
+              <a:rPr lang="es-ES" dirty="0"/>
+              <a:t>.</a:t>
+            </a:r>
+          </a:p>
+          <a:p>
+            <a:endParaRPr lang="es-ES" dirty="0"/>
+          </a:p>
+          <a:p>
+            <a:r>
+              <a:rPr lang="es-ES" dirty="0" err="1"/>
+              <a:t>If</a:t>
+            </a:r>
+            <a:r>
+              <a:rPr lang="es-ES" dirty="0"/>
+              <a:t> </a:t>
+            </a:r>
+            <a:r>
+              <a:rPr lang="es-ES" dirty="0" err="1"/>
+              <a:t>you</a:t>
+            </a:r>
+            <a:r>
+              <a:rPr lang="es-ES" dirty="0"/>
+              <a:t> </a:t>
+            </a:r>
+            <a:r>
+              <a:rPr lang="es-ES" dirty="0" err="1"/>
+              <a:t>have</a:t>
+            </a:r>
+            <a:r>
+              <a:rPr lang="es-ES" dirty="0"/>
+              <a:t> </a:t>
+            </a:r>
+            <a:r>
+              <a:rPr lang="es-ES" dirty="0" err="1"/>
+              <a:t>the</a:t>
+            </a:r>
+            <a:r>
+              <a:rPr lang="es-ES" dirty="0"/>
+              <a:t> driver </a:t>
+            </a:r>
+            <a:r>
+              <a:rPr lang="es-ES" dirty="0" err="1"/>
+              <a:t>connections</a:t>
+            </a:r>
+            <a:r>
+              <a:rPr lang="es-ES" dirty="0"/>
+              <a:t> </a:t>
+            </a:r>
+            <a:r>
+              <a:rPr lang="es-ES" dirty="0" err="1"/>
+              <a:t>on</a:t>
+            </a:r>
+            <a:r>
+              <a:rPr lang="es-ES" dirty="0"/>
+              <a:t> </a:t>
+            </a:r>
+            <a:r>
+              <a:rPr lang="es-ES" dirty="0" err="1"/>
+              <a:t>other</a:t>
+            </a:r>
+            <a:r>
+              <a:rPr lang="es-ES" dirty="0"/>
+              <a:t> </a:t>
+            </a:r>
+            <a:r>
+              <a:rPr lang="es-ES" dirty="0" err="1"/>
+              <a:t>pins</a:t>
+            </a:r>
+            <a:r>
+              <a:rPr lang="es-ES" dirty="0"/>
+              <a:t> </a:t>
+            </a:r>
+            <a:r>
+              <a:rPr lang="es-ES" dirty="0" err="1"/>
+              <a:t>than</a:t>
+            </a:r>
+            <a:r>
+              <a:rPr lang="es-ES" dirty="0"/>
+              <a:t> </a:t>
+            </a:r>
+            <a:r>
+              <a:rPr lang="es-ES" dirty="0" err="1"/>
+              <a:t>suggested</a:t>
+            </a:r>
+            <a:r>
+              <a:rPr lang="es-ES" dirty="0"/>
+              <a:t> </a:t>
+            </a:r>
+            <a:r>
+              <a:rPr lang="es-ES" dirty="0" err="1"/>
+              <a:t>then</a:t>
+            </a:r>
+            <a:r>
+              <a:rPr lang="es-ES" dirty="0"/>
+              <a:t> </a:t>
+            </a:r>
+            <a:r>
+              <a:rPr lang="es-ES" dirty="0" err="1"/>
+              <a:t>we</a:t>
+            </a:r>
+            <a:r>
+              <a:rPr lang="es-ES" dirty="0"/>
+              <a:t> </a:t>
+            </a:r>
+            <a:r>
+              <a:rPr lang="es-ES" dirty="0" err="1"/>
+              <a:t>should</a:t>
+            </a:r>
+            <a:r>
+              <a:rPr lang="es-ES" dirty="0"/>
+              <a:t> </a:t>
+            </a:r>
+            <a:r>
+              <a:rPr lang="es-ES" dirty="0" err="1"/>
+              <a:t>only</a:t>
+            </a:r>
+            <a:r>
+              <a:rPr lang="es-ES" dirty="0"/>
+              <a:t> </a:t>
+            </a:r>
+            <a:r>
+              <a:rPr lang="es-ES" dirty="0" err="1"/>
+              <a:t>modify</a:t>
+            </a:r>
+            <a:r>
+              <a:rPr lang="es-ES" dirty="0"/>
+              <a:t> </a:t>
+            </a:r>
+            <a:r>
+              <a:rPr lang="es-ES" dirty="0" err="1"/>
+              <a:t>the</a:t>
+            </a:r>
+            <a:r>
+              <a:rPr lang="es-ES" dirty="0"/>
+              <a:t> </a:t>
+            </a:r>
+            <a:r>
+              <a:rPr lang="es-ES" dirty="0" err="1"/>
+              <a:t>program</a:t>
+            </a:r>
+            <a:r>
+              <a:rPr lang="es-ES" dirty="0"/>
+              <a:t>.</a:t>
+            </a:r>
+          </a:p>
+        </p:txBody>
+      </p:sp>
+    </p:spTree>
+    <p:extLst>
+      <p:ext uri="{BB962C8B-B14F-4D97-AF65-F5344CB8AC3E}">
+        <p14:creationId xmlns:p14="http://schemas.microsoft.com/office/powerpoint/2010/main" val="1637200703"/>
+      </p:ext>
+    </p:extLst>
+  </p:cSld>
+  <p:clrMapOvr>
+    <a:masterClrMapping/>
+  </p:clrMapOvr>
+</p:sld>
+</file>
+
 <file path=ppt/theme/theme1.xml><?xml version="1.0" encoding="utf-8"?>
 <a:theme xmlns:a="http://schemas.openxmlformats.org/drawingml/2006/main" name="Tema de Office">
   <a:themeElements>

</xml_diff>